<commit_message>
[Stress Analysis reports] 3 materials comparisons
</commit_message>
<xml_diff>
--- a/Presentation/presentation.pptx
+++ b/Presentation/presentation.pptx
@@ -5,25 +5,26 @@
     <p:sldMasterId id="2147483648" r:id="rId4"/>
   </p:sldMasterIdLst>
   <p:notesMasterIdLst>
-    <p:notesMasterId r:id="rId18"/>
+    <p:notesMasterId r:id="rId19"/>
   </p:notesMasterIdLst>
   <p:handoutMasterIdLst>
-    <p:handoutMasterId r:id="rId19"/>
+    <p:handoutMasterId r:id="rId20"/>
   </p:handoutMasterIdLst>
   <p:sldIdLst>
     <p:sldId id="257" r:id="rId5"/>
     <p:sldId id="279" r:id="rId6"/>
     <p:sldId id="271" r:id="rId7"/>
-    <p:sldId id="269" r:id="rId8"/>
-    <p:sldId id="277" r:id="rId9"/>
-    <p:sldId id="270" r:id="rId10"/>
-    <p:sldId id="278" r:id="rId11"/>
-    <p:sldId id="272" r:id="rId12"/>
-    <p:sldId id="280" r:id="rId13"/>
-    <p:sldId id="273" r:id="rId14"/>
-    <p:sldId id="266" r:id="rId15"/>
-    <p:sldId id="256" r:id="rId16"/>
-    <p:sldId id="276" r:id="rId17"/>
+    <p:sldId id="281" r:id="rId8"/>
+    <p:sldId id="269" r:id="rId9"/>
+    <p:sldId id="277" r:id="rId10"/>
+    <p:sldId id="270" r:id="rId11"/>
+    <p:sldId id="278" r:id="rId12"/>
+    <p:sldId id="272" r:id="rId13"/>
+    <p:sldId id="280" r:id="rId14"/>
+    <p:sldId id="273" r:id="rId15"/>
+    <p:sldId id="266" r:id="rId16"/>
+    <p:sldId id="256" r:id="rId17"/>
+    <p:sldId id="276" r:id="rId18"/>
   </p:sldIdLst>
   <p:sldSz cx="12192000" cy="6858000"/>
   <p:notesSz cx="6858000" cy="9144000"/>
@@ -2100,7 +2101,7 @@
           <a:p>
             <a:fld id="{97AB3EA8-A58D-4C92-A3AB-D271CCC294C7}" type="datetimeFigureOut">
               <a:rPr lang="en-US" smtClean="0"/>
-              <a:t>7/29/2021</a:t>
+              <a:t>7/30/2021</a:t>
             </a:fld>
             <a:endParaRPr lang="en-US" dirty="0"/>
           </a:p>
@@ -2277,7 +2278,7 @@
           <a:p>
             <a:fld id="{0AEFB4FA-E877-413E-B608-88789D806C57}" type="datetimeFigureOut">
               <a:rPr lang="en-US" noProof="0" smtClean="0"/>
-              <a:t>7/29/2021</a:t>
+              <a:t>7/30/2021</a:t>
             </a:fld>
             <a:endParaRPr lang="en-US" noProof="0" dirty="0"/>
           </a:p>
@@ -2693,7 +2694,7 @@
           <a:p>
             <a:fld id="{6336304E-FDE3-4B4F-A3B7-EBE87F3FA5E2}" type="slidenum">
               <a:rPr lang="en-US" noProof="0" smtClean="0"/>
-              <a:t>11</a:t>
+              <a:t>12</a:t>
             </a:fld>
             <a:endParaRPr lang="en-US" noProof="0" dirty="0"/>
           </a:p>
@@ -2777,7 +2778,7 @@
           <a:p>
             <a:fld id="{6336304E-FDE3-4B4F-A3B7-EBE87F3FA5E2}" type="slidenum">
               <a:rPr lang="en-US" noProof="0" smtClean="0"/>
-              <a:t>12</a:t>
+              <a:t>13</a:t>
             </a:fld>
             <a:endParaRPr lang="en-US" noProof="0" dirty="0"/>
           </a:p>
@@ -2861,7 +2862,7 @@
           <a:p>
             <a:fld id="{6336304E-FDE3-4B4F-A3B7-EBE87F3FA5E2}" type="slidenum">
               <a:rPr lang="en-US" noProof="0" smtClean="0"/>
-              <a:t>13</a:t>
+              <a:t>14</a:t>
             </a:fld>
             <a:endParaRPr lang="en-US" noProof="0" dirty="0"/>
           </a:p>
@@ -3029,7 +3030,7 @@
           <a:p>
             <a:fld id="{6336304E-FDE3-4B4F-A3B7-EBE87F3FA5E2}" type="slidenum">
               <a:rPr lang="en-US" smtClean="0"/>
-              <a:t>4</a:t>
+              <a:t>5</a:t>
             </a:fld>
             <a:endParaRPr lang="en-US"/>
           </a:p>
@@ -3113,7 +3114,7 @@
           <a:p>
             <a:fld id="{6336304E-FDE3-4B4F-A3B7-EBE87F3FA5E2}" type="slidenum">
               <a:rPr lang="en-US" smtClean="0"/>
-              <a:t>5</a:t>
+              <a:t>6</a:t>
             </a:fld>
             <a:endParaRPr lang="en-US"/>
           </a:p>
@@ -3197,7 +3198,7 @@
           <a:p>
             <a:fld id="{6336304E-FDE3-4B4F-A3B7-EBE87F3FA5E2}" type="slidenum">
               <a:rPr lang="en-US" smtClean="0"/>
-              <a:t>6</a:t>
+              <a:t>7</a:t>
             </a:fld>
             <a:endParaRPr lang="en-US"/>
           </a:p>
@@ -3281,7 +3282,7 @@
           <a:p>
             <a:fld id="{6336304E-FDE3-4B4F-A3B7-EBE87F3FA5E2}" type="slidenum">
               <a:rPr lang="en-US" smtClean="0"/>
-              <a:t>7</a:t>
+              <a:t>8</a:t>
             </a:fld>
             <a:endParaRPr lang="en-US"/>
           </a:p>
@@ -3365,7 +3366,7 @@
           <a:p>
             <a:fld id="{6336304E-FDE3-4B4F-A3B7-EBE87F3FA5E2}" type="slidenum">
               <a:rPr lang="en-US" smtClean="0"/>
-              <a:t>8</a:t>
+              <a:t>9</a:t>
             </a:fld>
             <a:endParaRPr lang="en-US"/>
           </a:p>
@@ -3449,7 +3450,7 @@
           <a:p>
             <a:fld id="{6336304E-FDE3-4B4F-A3B7-EBE87F3FA5E2}" type="slidenum">
               <a:rPr lang="en-US" smtClean="0"/>
-              <a:t>9</a:t>
+              <a:t>10</a:t>
             </a:fld>
             <a:endParaRPr lang="en-US"/>
           </a:p>
@@ -3533,7 +3534,7 @@
           <a:p>
             <a:fld id="{6336304E-FDE3-4B4F-A3B7-EBE87F3FA5E2}" type="slidenum">
               <a:rPr lang="en-US" smtClean="0"/>
-              <a:t>10</a:t>
+              <a:t>11</a:t>
             </a:fld>
             <a:endParaRPr lang="en-US"/>
           </a:p>
@@ -4832,7 +4833,7 @@
                 <a14:useLocalDpi xmlns:a14="http://schemas.microsoft.com/office/drawing/2010/main"/>
               </a:ext>
               <a:ext uri="{96DAC541-7B7A-43D3-8B79-37D633B846F1}">
-                <asvg:svgBlip xmlns="" xmlns:asvg="http://schemas.microsoft.com/office/drawing/2016/SVG/main" r:embed="rId4"/>
+                <asvg:svgBlip xmlns:asvg="http://schemas.microsoft.com/office/drawing/2016/SVG/main" xmlns="" r:embed="rId4"/>
               </a:ext>
             </a:extLst>
           </a:blip>
@@ -4871,7 +4872,7 @@
                 <a14:useLocalDpi xmlns:a14="http://schemas.microsoft.com/office/drawing/2010/main"/>
               </a:ext>
               <a:ext uri="{96DAC541-7B7A-43D3-8B79-37D633B846F1}">
-                <asvg:svgBlip xmlns="" xmlns:asvg="http://schemas.microsoft.com/office/drawing/2016/SVG/main" r:embed="rId6"/>
+                <asvg:svgBlip xmlns:asvg="http://schemas.microsoft.com/office/drawing/2016/SVG/main" xmlns="" r:embed="rId6"/>
               </a:ext>
             </a:extLst>
           </a:blip>
@@ -19140,7 +19141,7 @@
           <a:p>
             <a:fld id="{D951F27F-98F9-A147-8986-34441C7B752D}" type="datetime1">
               <a:rPr lang="en-US" noProof="0" smtClean="0"/>
-              <a:t>7/29/2021</a:t>
+              <a:t>7/30/2021</a:t>
             </a:fld>
             <a:endParaRPr lang="en-US" noProof="0" dirty="0"/>
           </a:p>
@@ -19719,6 +19720,331 @@
           <p:cNvPr id="2" name="Title 1">
             <a:extLst>
               <a:ext uri="{FF2B5EF4-FFF2-40B4-BE49-F238E27FC236}">
+                <a16:creationId xmlns:a16="http://schemas.microsoft.com/office/drawing/2014/main" id="{1C63C2D9-0850-4620-BE32-11F44A927662}"/>
+              </a:ext>
+            </a:extLst>
+          </p:cNvPr>
+          <p:cNvSpPr>
+            <a:spLocks noGrp="1"/>
+          </p:cNvSpPr>
+          <p:nvPr>
+            <p:ph type="title"/>
+          </p:nvPr>
+        </p:nvSpPr>
+        <p:spPr/>
+        <p:txBody>
+          <a:bodyPr/>
+          <a:lstStyle/>
+          <a:p>
+            <a:r>
+              <a:rPr lang="en-US" dirty="0" smtClean="0"/>
+              <a:t>NOTE 02</a:t>
+            </a:r>
+            <a:endParaRPr lang="en-US" dirty="0"/>
+          </a:p>
+        </p:txBody>
+      </p:sp>
+      <p:sp>
+        <p:nvSpPr>
+          <p:cNvPr id="5" name="Content Placeholder 4">
+            <a:extLst>
+              <a:ext uri="{FF2B5EF4-FFF2-40B4-BE49-F238E27FC236}">
+                <a16:creationId xmlns:a16="http://schemas.microsoft.com/office/drawing/2014/main" id="{93A6F33C-3AFE-474E-AC15-C00F368C3C6A}"/>
+              </a:ext>
+            </a:extLst>
+          </p:cNvPr>
+          <p:cNvSpPr>
+            <a:spLocks noGrp="1"/>
+          </p:cNvSpPr>
+          <p:nvPr>
+            <p:ph idx="15"/>
+          </p:nvPr>
+        </p:nvSpPr>
+        <p:spPr/>
+        <p:txBody>
+          <a:bodyPr/>
+          <a:lstStyle/>
+          <a:p>
+            <a:r>
+              <a:rPr lang="en-US" dirty="0" smtClean="0"/>
+              <a:t>NOTE 03       not achieved</a:t>
+            </a:r>
+            <a:endParaRPr lang="en-US" dirty="0"/>
+          </a:p>
+        </p:txBody>
+      </p:sp>
+      <p:pic>
+        <p:nvPicPr>
+          <p:cNvPr id="29" name="Picture Placeholder 28" descr="Pencil">
+            <a:extLst>
+              <a:ext uri="{FF2B5EF4-FFF2-40B4-BE49-F238E27FC236}">
+                <a16:creationId xmlns:a16="http://schemas.microsoft.com/office/drawing/2014/main" id="{F0E35123-11A3-CD40-A44F-8A81B9105639}"/>
+              </a:ext>
+            </a:extLst>
+          </p:cNvPr>
+          <p:cNvPicPr>
+            <a:picLocks noGrp="1" noChangeAspect="1"/>
+          </p:cNvPicPr>
+          <p:nvPr>
+            <p:ph type="pic" sz="quarter" idx="21"/>
+          </p:nvPr>
+        </p:nvPicPr>
+        <p:blipFill>
+          <a:blip r:embed="rId3">
+            <a:extLst>
+              <a:ext uri="{28A0092B-C50C-407E-A947-70E740481C1C}">
+                <a14:useLocalDpi xmlns:a14="http://schemas.microsoft.com/office/drawing/2010/main"/>
+              </a:ext>
+              <a:ext uri="{96DAC541-7B7A-43D3-8B79-37D633B846F1}">
+                <asvg:svgBlip xmlns:asvg="http://schemas.microsoft.com/office/drawing/2016/SVG/main" xmlns="" r:embed="rId4"/>
+              </a:ext>
+            </a:extLst>
+          </a:blip>
+          <a:srcRect/>
+          <a:stretch>
+            <a:fillRect/>
+          </a:stretch>
+        </p:blipFill>
+        <p:spPr/>
+      </p:pic>
+      <p:sp>
+        <p:nvSpPr>
+          <p:cNvPr id="3" name="Content Placeholder 2">
+            <a:extLst>
+              <a:ext uri="{FF2B5EF4-FFF2-40B4-BE49-F238E27FC236}">
+                <a16:creationId xmlns:a16="http://schemas.microsoft.com/office/drawing/2014/main" id="{65015163-D5FD-4849-978B-77883FAF7928}"/>
+              </a:ext>
+            </a:extLst>
+          </p:cNvPr>
+          <p:cNvSpPr>
+            <a:spLocks noGrp="1"/>
+          </p:cNvSpPr>
+          <p:nvPr>
+            <p:ph idx="1"/>
+          </p:nvPr>
+        </p:nvSpPr>
+        <p:spPr/>
+        <p:txBody>
+          <a:bodyPr/>
+          <a:lstStyle/>
+          <a:p>
+            <a:pPr marL="285750" indent="-285750" algn="l">
+              <a:buFontTx/>
+              <a:buChar char="-"/>
+            </a:pPr>
+            <a:r>
+              <a:rPr lang="en-US" sz="2400" dirty="0" smtClean="0"/>
+              <a:t>Synchronizing subsequent adaptive milling operations.</a:t>
+            </a:r>
+          </a:p>
+          <a:p>
+            <a:pPr marL="285750" indent="-285750" algn="l">
+              <a:buFontTx/>
+              <a:buChar char="-"/>
+            </a:pPr>
+            <a:r>
+              <a:rPr lang="en-US" sz="2400" dirty="0" smtClean="0"/>
+              <a:t>Filleting for the axle support.</a:t>
+            </a:r>
+          </a:p>
+          <a:p>
+            <a:pPr marL="285750" indent="-285750" algn="l">
+              <a:buFontTx/>
+              <a:buChar char="-"/>
+            </a:pPr>
+            <a:r>
+              <a:rPr lang="en-US" sz="2400" dirty="0" smtClean="0"/>
+              <a:t>Smooth finishing for the axle support’s rib.</a:t>
+            </a:r>
+          </a:p>
+          <a:p>
+            <a:pPr marL="285750" indent="-285750" algn="l">
+              <a:buFontTx/>
+              <a:buChar char="-"/>
+            </a:pPr>
+            <a:endParaRPr lang="en-US" sz="2400" dirty="0" smtClean="0"/>
+          </a:p>
+          <a:p>
+            <a:pPr algn="l"/>
+            <a:endParaRPr lang="en-US" sz="2400" dirty="0" smtClean="0"/>
+          </a:p>
+          <a:p>
+            <a:pPr marL="285750" indent="-285750" algn="l">
+              <a:buFontTx/>
+              <a:buChar char="-"/>
+            </a:pPr>
+            <a:endParaRPr lang="en-US" sz="2400" dirty="0" smtClean="0"/>
+          </a:p>
+          <a:p>
+            <a:pPr marL="285750" indent="-285750" algn="l">
+              <a:buFontTx/>
+              <a:buChar char="-"/>
+            </a:pPr>
+            <a:endParaRPr lang="en-US" sz="2400" dirty="0"/>
+          </a:p>
+        </p:txBody>
+      </p:sp>
+      <p:sp>
+        <p:nvSpPr>
+          <p:cNvPr id="8" name="Content Placeholder 7">
+            <a:extLst>
+              <a:ext uri="{FF2B5EF4-FFF2-40B4-BE49-F238E27FC236}">
+                <a16:creationId xmlns:a16="http://schemas.microsoft.com/office/drawing/2014/main" id="{C8438480-8B6F-44E5-A602-6240C1B85FB3}"/>
+              </a:ext>
+            </a:extLst>
+          </p:cNvPr>
+          <p:cNvSpPr>
+            <a:spLocks noGrp="1"/>
+          </p:cNvSpPr>
+          <p:nvPr>
+            <p:ph idx="19"/>
+          </p:nvPr>
+        </p:nvSpPr>
+        <p:spPr/>
+        <p:txBody>
+          <a:bodyPr/>
+          <a:lstStyle/>
+          <a:p>
+            <a:r>
+              <a:rPr lang="en-US" sz="1600" dirty="0" smtClean="0"/>
+              <a:t>-  TODO</a:t>
+            </a:r>
+            <a:endParaRPr lang="en-US" sz="1600" dirty="0"/>
+          </a:p>
+        </p:txBody>
+      </p:sp>
+      <p:pic>
+        <p:nvPicPr>
+          <p:cNvPr id="31" name="Picture Placeholder 30" descr="Laptop">
+            <a:extLst>
+              <a:ext uri="{FF2B5EF4-FFF2-40B4-BE49-F238E27FC236}">
+                <a16:creationId xmlns:a16="http://schemas.microsoft.com/office/drawing/2014/main" id="{6BF407E9-98AE-2B40-90E3-1B14FC14FDB8}"/>
+              </a:ext>
+            </a:extLst>
+          </p:cNvPr>
+          <p:cNvPicPr>
+            <a:picLocks noGrp="1" noChangeAspect="1"/>
+          </p:cNvPicPr>
+          <p:nvPr>
+            <p:ph type="pic" sz="quarter" idx="22"/>
+          </p:nvPr>
+        </p:nvPicPr>
+        <p:blipFill>
+          <a:blip r:embed="rId5" cstate="print">
+            <a:extLst>
+              <a:ext uri="{28A0092B-C50C-407E-A947-70E740481C1C}">
+                <a14:useLocalDpi xmlns:a14="http://schemas.microsoft.com/office/drawing/2010/main"/>
+              </a:ext>
+              <a:ext uri="{96DAC541-7B7A-43D3-8B79-37D633B846F1}">
+                <asvg:svgBlip xmlns:asvg="http://schemas.microsoft.com/office/drawing/2016/SVG/main" xmlns="" r:embed="rId6"/>
+              </a:ext>
+            </a:extLst>
+          </a:blip>
+          <a:srcRect/>
+          <a:stretch>
+            <a:fillRect/>
+          </a:stretch>
+        </p:blipFill>
+        <p:spPr/>
+      </p:pic>
+      <p:sp>
+        <p:nvSpPr>
+          <p:cNvPr id="9" name="Content Placeholder 8">
+            <a:extLst>
+              <a:ext uri="{FF2B5EF4-FFF2-40B4-BE49-F238E27FC236}">
+                <a16:creationId xmlns:a16="http://schemas.microsoft.com/office/drawing/2014/main" id="{A1EE8A19-6968-4C81-B180-20FEF61ADEE1}"/>
+              </a:ext>
+            </a:extLst>
+          </p:cNvPr>
+          <p:cNvSpPr>
+            <a:spLocks noGrp="1"/>
+          </p:cNvSpPr>
+          <p:nvPr>
+            <p:ph idx="20"/>
+          </p:nvPr>
+        </p:nvSpPr>
+        <p:spPr/>
+        <p:txBody>
+          <a:bodyPr/>
+          <a:lstStyle/>
+          <a:p>
+            <a:r>
+              <a:rPr lang="en-US" dirty="0" smtClean="0"/>
+              <a:t>NOTE 02    </a:t>
+            </a:r>
+            <a:r>
+              <a:rPr lang="en-US" dirty="0" err="1" smtClean="0"/>
+              <a:t>todo</a:t>
+            </a:r>
+            <a:endParaRPr lang="en-US" dirty="0"/>
+          </a:p>
+        </p:txBody>
+      </p:sp>
+      <p:sp>
+        <p:nvSpPr>
+          <p:cNvPr id="4" name="Slide Number Placeholder 3">
+            <a:extLst>
+              <a:ext uri="{FF2B5EF4-FFF2-40B4-BE49-F238E27FC236}">
+                <a16:creationId xmlns:a16="http://schemas.microsoft.com/office/drawing/2014/main" id="{CA1C0347-C2C9-46A2-B7A6-9653B525F7DD}"/>
+              </a:ext>
+            </a:extLst>
+          </p:cNvPr>
+          <p:cNvSpPr>
+            <a:spLocks noGrp="1"/>
+          </p:cNvSpPr>
+          <p:nvPr>
+            <p:ph type="sldNum" sz="quarter" idx="12"/>
+          </p:nvPr>
+        </p:nvSpPr>
+        <p:spPr/>
+        <p:txBody>
+          <a:bodyPr/>
+          <a:lstStyle/>
+          <a:p>
+            <a:fld id="{9EC71654-96A5-4280-94F3-931C61A9F92C}" type="slidenum">
+              <a:rPr lang="en-US" smtClean="0"/>
+              <a:pPr/>
+              <a:t>10</a:t>
+            </a:fld>
+            <a:endParaRPr lang="en-US" dirty="0"/>
+          </a:p>
+        </p:txBody>
+      </p:sp>
+    </p:spTree>
+    <p:extLst>
+      <p:ext uri="{BB962C8B-B14F-4D97-AF65-F5344CB8AC3E}">
+        <p14:creationId xmlns:p14="http://schemas.microsoft.com/office/powerpoint/2010/main" val="1750884515"/>
+      </p:ext>
+    </p:extLst>
+  </p:cSld>
+  <p:clrMapOvr>
+    <a:masterClrMapping/>
+  </p:clrMapOvr>
+</p:sld>
+</file>
+
+<file path=ppt/slides/slide11.xml><?xml version="1.0" encoding="utf-8"?>
+<p:sld xmlns:a="http://schemas.openxmlformats.org/drawingml/2006/main" xmlns:r="http://schemas.openxmlformats.org/officeDocument/2006/relationships" xmlns:p="http://schemas.openxmlformats.org/presentationml/2006/main">
+  <p:cSld>
+    <p:spTree>
+      <p:nvGrpSpPr>
+        <p:cNvPr id="1" name=""/>
+        <p:cNvGrpSpPr/>
+        <p:nvPr/>
+      </p:nvGrpSpPr>
+      <p:grpSpPr>
+        <a:xfrm>
+          <a:off x="0" y="0"/>
+          <a:ext cx="0" cy="0"/>
+          <a:chOff x="0" y="0"/>
+          <a:chExt cx="0" cy="0"/>
+        </a:xfrm>
+      </p:grpSpPr>
+      <p:sp>
+        <p:nvSpPr>
+          <p:cNvPr id="2" name="Title 1">
+            <a:extLst>
+              <a:ext uri="{FF2B5EF4-FFF2-40B4-BE49-F238E27FC236}">
                 <a16:creationId xmlns:a16="http://schemas.microsoft.com/office/drawing/2014/main" id="{4332B532-EB3E-428B-9224-EFA237D16A73}"/>
               </a:ext>
             </a:extLst>
@@ -19822,7 +20148,7 @@
             <a:fld id="{9EC71654-96A5-4280-94F3-931C61A9F92C}" type="slidenum">
               <a:rPr lang="en-US" smtClean="0"/>
               <a:pPr/>
-              <a:t>10</a:t>
+              <a:t>11</a:t>
             </a:fld>
             <a:endParaRPr lang="en-US" dirty="0"/>
           </a:p>
@@ -19841,7 +20167,7 @@
 </p:sld>
 </file>
 
-<file path=ppt/slides/slide11.xml><?xml version="1.0" encoding="utf-8"?>
+<file path=ppt/slides/slide12.xml><?xml version="1.0" encoding="utf-8"?>
 <p:sld xmlns:a="http://schemas.openxmlformats.org/drawingml/2006/main" xmlns:r="http://schemas.openxmlformats.org/officeDocument/2006/relationships" xmlns:p="http://schemas.openxmlformats.org/presentationml/2006/main">
   <p:cSld>
     <p:spTree>
@@ -23265,7 +23591,7 @@
 </p:sld>
 </file>
 
-<file path=ppt/slides/slide12.xml><?xml version="1.0" encoding="utf-8"?>
+<file path=ppt/slides/slide13.xml><?xml version="1.0" encoding="utf-8"?>
 <p:sld xmlns:a="http://schemas.openxmlformats.org/drawingml/2006/main" xmlns:r="http://schemas.openxmlformats.org/officeDocument/2006/relationships" xmlns:p="http://schemas.openxmlformats.org/presentationml/2006/main">
   <p:cSld>
     <p:spTree>
@@ -23376,7 +23702,7 @@
             <a:fld id="{9EC71654-96A5-4280-94F3-931C61A9F92C}" type="slidenum">
               <a:rPr lang="en-US" smtClean="0"/>
               <a:pPr/>
-              <a:t>12</a:t>
+              <a:t>13</a:t>
             </a:fld>
             <a:endParaRPr lang="en-US" dirty="0"/>
           </a:p>
@@ -23395,7 +23721,7 @@
 </p:sld>
 </file>
 
-<file path=ppt/slides/slide13.xml><?xml version="1.0" encoding="utf-8"?>
+<file path=ppt/slides/slide14.xml><?xml version="1.0" encoding="utf-8"?>
 <p:sld xmlns:a="http://schemas.openxmlformats.org/drawingml/2006/main" xmlns:r="http://schemas.openxmlformats.org/officeDocument/2006/relationships" xmlns:p="http://schemas.openxmlformats.org/presentationml/2006/main">
   <p:cSld>
     <p:spTree>
@@ -23580,9 +23906,86 @@
             <a:pPr algn="ctr"/>
             <a:r>
               <a:rPr lang="en-US" dirty="0" smtClean="0"/>
-              <a:t>Video</a:t>
+              <a:t>Problem</a:t>
             </a:r>
             <a:endParaRPr lang="en-US" dirty="0"/>
+          </a:p>
+        </p:txBody>
+      </p:sp>
+      <p:sp>
+        <p:nvSpPr>
+          <p:cNvPr id="2" name="TextBox 1"/>
+          <p:cNvSpPr txBox="1"/>
+          <p:nvPr/>
+        </p:nvSpPr>
+        <p:spPr>
+          <a:xfrm>
+            <a:off x="1238596" y="1695796"/>
+            <a:ext cx="5735782" cy="4154984"/>
+          </a:xfrm>
+          <a:prstGeom prst="rect">
+            <a:avLst/>
+          </a:prstGeom>
+          <a:noFill/>
+        </p:spPr>
+        <p:txBody>
+          <a:bodyPr wrap="square" rtlCol="0">
+            <a:spAutoFit/>
+          </a:bodyPr>
+          <a:lstStyle/>
+          <a:p>
+            <a:pPr marL="285750" indent="-285750">
+              <a:buFontTx/>
+              <a:buChar char="-"/>
+            </a:pPr>
+            <a:r>
+              <a:rPr lang="en-US" sz="4400" b="1" dirty="0" smtClean="0"/>
+              <a:t>Heavy tracks. Casts.</a:t>
+            </a:r>
+          </a:p>
+          <a:p>
+            <a:pPr marL="285750" indent="-285750">
+              <a:buFontTx/>
+              <a:buChar char="-"/>
+            </a:pPr>
+            <a:r>
+              <a:rPr lang="en-US" sz="4400" b="1" dirty="0" smtClean="0"/>
+              <a:t>Complicated plate tracks.</a:t>
+            </a:r>
+          </a:p>
+          <a:p>
+            <a:pPr marL="285750" indent="-285750">
+              <a:buFontTx/>
+              <a:buChar char="-"/>
+            </a:pPr>
+            <a:r>
+              <a:rPr lang="en-US" sz="4400" b="1" dirty="0" smtClean="0"/>
+              <a:t>Enormous hydraulics.</a:t>
+            </a:r>
+          </a:p>
+          <a:p>
+            <a:pPr marL="285750" indent="-285750">
+              <a:buFontTx/>
+              <a:buChar char="-"/>
+            </a:pPr>
+            <a:r>
+              <a:rPr lang="en-US" sz="4400" b="1" dirty="0" smtClean="0"/>
+              <a:t>Costly tracks.</a:t>
+            </a:r>
+          </a:p>
+          <a:p>
+            <a:r>
+              <a:rPr lang="en-US" sz="4400" b="1" dirty="0"/>
+              <a:t>	</a:t>
+            </a:r>
+            <a:r>
+              <a:rPr lang="en-US" sz="4400" b="1" dirty="0" smtClean="0"/>
+              <a:t>	(</a:t>
+            </a:r>
+            <a:r>
+              <a:rPr lang="en-US" sz="4000" b="1" i="1" u="sng" dirty="0" smtClean="0"/>
+              <a:t>Video Evidence)</a:t>
+            </a:r>
           </a:p>
         </p:txBody>
       </p:sp>
@@ -23719,7 +24122,7 @@
                 <a14:useLocalDpi xmlns:a14="http://schemas.microsoft.com/office/drawing/2010/main"/>
               </a:ext>
               <a:ext uri="{96DAC541-7B7A-43D3-8B79-37D633B846F1}">
-                <asvg:svgBlip xmlns="" xmlns:asvg="http://schemas.microsoft.com/office/drawing/2016/SVG/main" r:embed="rId5"/>
+                <asvg:svgBlip xmlns:asvg="http://schemas.microsoft.com/office/drawing/2016/SVG/main" xmlns="" r:embed="rId5"/>
               </a:ext>
             </a:extLst>
           </a:blip>
@@ -23814,7 +24217,7 @@
                 <a14:useLocalDpi xmlns:a14="http://schemas.microsoft.com/office/drawing/2010/main"/>
               </a:ext>
               <a:ext uri="{96DAC541-7B7A-43D3-8B79-37D633B846F1}">
-                <asvg:svgBlip xmlns="" xmlns:asvg="http://schemas.microsoft.com/office/drawing/2016/SVG/main" r:embed="rId8"/>
+                <asvg:svgBlip xmlns:asvg="http://schemas.microsoft.com/office/drawing/2016/SVG/main" xmlns="" r:embed="rId8"/>
               </a:ext>
             </a:extLst>
           </a:blip>
@@ -23972,13 +24375,8 @@
             </a:pPr>
             <a:r>
               <a:rPr lang="en-US" dirty="0" smtClean="0"/>
-              <a:t>Caster angle of </a:t>
+              <a:t>Caster angle of approximately 15</a:t>
             </a:r>
-            <a:r>
-              <a:rPr lang="en-US" dirty="0" smtClean="0"/>
-              <a:t>approximately 15</a:t>
-            </a:r>
-            <a:endParaRPr lang="en-US" dirty="0" smtClean="0"/>
           </a:p>
           <a:p>
             <a:pPr marL="285750" indent="-285750">
@@ -23987,11 +24385,7 @@
             </a:pPr>
             <a:r>
               <a:rPr lang="en-US" dirty="0" smtClean="0"/>
-              <a:t>0.03791mm  </a:t>
-            </a:r>
-            <a:r>
-              <a:rPr lang="en-US" dirty="0" smtClean="0"/>
-              <a:t>Y displacement </a:t>
+              <a:t>0.03791mm  Y displacement </a:t>
             </a:r>
             <a:endParaRPr lang="en-US" dirty="0"/>
           </a:p>
@@ -24056,11 +24450,7 @@
             </a:pPr>
             <a:r>
               <a:rPr lang="en-US" dirty="0" smtClean="0"/>
-              <a:t>Zero Caster </a:t>
-            </a:r>
-            <a:r>
-              <a:rPr lang="en-US" dirty="0" smtClean="0"/>
-              <a:t>angle</a:t>
+              <a:t>Zero Caster angle</a:t>
             </a:r>
           </a:p>
           <a:p>
@@ -24070,13 +24460,8 @@
             </a:pPr>
             <a:r>
               <a:rPr lang="en-US" dirty="0" smtClean="0"/>
-              <a:t>0.02132mm Y displacement </a:t>
+              <a:t>0.02132mm Y displacement  </a:t>
             </a:r>
-            <a:r>
-              <a:rPr lang="en-US" dirty="0" smtClean="0"/>
-              <a:t> </a:t>
-            </a:r>
-            <a:endParaRPr lang="en-US" dirty="0" smtClean="0"/>
           </a:p>
           <a:p>
             <a:pPr marL="285750" indent="-285750">
@@ -24119,13 +24504,112 @@
       </p:grpSpPr>
       <p:sp>
         <p:nvSpPr>
-          <p:cNvPr id="2" name="Title 1">
-            <a:extLst>
-              <a:ext uri="{FF2B5EF4-FFF2-40B4-BE49-F238E27FC236}">
-                <a16:creationId xmlns:a16="http://schemas.microsoft.com/office/drawing/2014/main" id="{E2C50832-0B36-43C5-98EC-4CD165D78718}"/>
-              </a:ext>
-            </a:extLst>
-          </p:cNvPr>
+          <p:cNvPr id="5" name="Slide Number Placeholder 4"/>
+          <p:cNvSpPr>
+            <a:spLocks noGrp="1"/>
+          </p:cNvSpPr>
+          <p:nvPr>
+            <p:ph type="sldNum" sz="quarter" idx="12"/>
+          </p:nvPr>
+        </p:nvSpPr>
+        <p:spPr/>
+        <p:txBody>
+          <a:bodyPr/>
+          <a:lstStyle/>
+          <a:p>
+            <a:fld id="{9EC71654-96A5-4280-94F3-931C61A9F92C}" type="slidenum">
+              <a:rPr lang="en-US" noProof="0" smtClean="0"/>
+              <a:pPr/>
+              <a:t>4</a:t>
+            </a:fld>
+            <a:endParaRPr lang="en-US" noProof="0" dirty="0"/>
+          </a:p>
+        </p:txBody>
+      </p:sp>
+      <p:sp>
+        <p:nvSpPr>
+          <p:cNvPr id="12" name="Content Placeholder 11"/>
+          <p:cNvSpPr>
+            <a:spLocks noGrp="1"/>
+          </p:cNvSpPr>
+          <p:nvPr>
+            <p:ph sz="half" idx="1"/>
+          </p:nvPr>
+        </p:nvSpPr>
+        <p:spPr/>
+        <p:txBody>
+          <a:bodyPr>
+            <a:normAutofit/>
+          </a:bodyPr>
+          <a:lstStyle/>
+          <a:p>
+            <a:pPr marL="0" indent="0" algn="ctr">
+              <a:buNone/>
+            </a:pPr>
+            <a:r>
+              <a:rPr lang="en-US" sz="2000" dirty="0" smtClean="0"/>
+              <a:t>STAINLESS  STEEL</a:t>
+            </a:r>
+            <a:endParaRPr lang="en-US" sz="2000" dirty="0"/>
+          </a:p>
+        </p:txBody>
+      </p:sp>
+      <p:sp>
+        <p:nvSpPr>
+          <p:cNvPr id="13" name="Content Placeholder 12"/>
+          <p:cNvSpPr>
+            <a:spLocks noGrp="1"/>
+          </p:cNvSpPr>
+          <p:nvPr>
+            <p:ph sz="half" idx="2"/>
+          </p:nvPr>
+        </p:nvSpPr>
+        <p:spPr/>
+        <p:txBody>
+          <a:bodyPr/>
+          <a:lstStyle/>
+          <a:p>
+            <a:pPr marL="0" indent="0" algn="ctr">
+              <a:buNone/>
+            </a:pPr>
+            <a:r>
+              <a:rPr lang="en-US" sz="2000" dirty="0" smtClean="0"/>
+              <a:t>CARBON STEEL</a:t>
+            </a:r>
+          </a:p>
+          <a:p>
+            <a:pPr marL="0" indent="0" algn="ctr">
+              <a:buNone/>
+            </a:pPr>
+            <a:endParaRPr lang="en-US" dirty="0" smtClean="0"/>
+          </a:p>
+          <a:p>
+            <a:pPr marL="0" indent="0" algn="ctr">
+              <a:buNone/>
+            </a:pPr>
+            <a:endParaRPr lang="en-US" dirty="0"/>
+          </a:p>
+          <a:p>
+            <a:pPr marL="0" indent="0" algn="ctr">
+              <a:buNone/>
+            </a:pPr>
+            <a:endParaRPr lang="en-US" dirty="0"/>
+          </a:p>
+          <a:p>
+            <a:pPr marL="0" indent="0" algn="ctr">
+              <a:buNone/>
+            </a:pPr>
+            <a:r>
+              <a:rPr lang="en-US" sz="2000" dirty="0" smtClean="0"/>
+              <a:t>MALLEABLE IRON</a:t>
+            </a:r>
+            <a:endParaRPr lang="en-US" sz="2000" dirty="0"/>
+          </a:p>
+        </p:txBody>
+      </p:sp>
+      <p:sp>
+        <p:nvSpPr>
+          <p:cNvPr id="11" name="Title 10"/>
           <p:cNvSpPr>
             <a:spLocks noGrp="1"/>
           </p:cNvSpPr>
@@ -24138,298 +24622,11 @@
           <a:bodyPr/>
           <a:lstStyle/>
           <a:p>
+            <a:pPr algn="ctr"/>
             <a:r>
               <a:rPr lang="en-US" dirty="0" smtClean="0"/>
-              <a:t>TOP PLATE </a:t>
+              <a:t>Material</a:t>
             </a:r>
-            <a:r>
-              <a:rPr lang="en-US" dirty="0"/>
-              <a:t>01</a:t>
-            </a:r>
-            <a:br>
-              <a:rPr lang="en-US" dirty="0"/>
-            </a:br>
-            <a:endParaRPr lang="en-US" dirty="0"/>
-          </a:p>
-        </p:txBody>
-      </p:sp>
-      <p:sp>
-        <p:nvSpPr>
-          <p:cNvPr id="3" name="Content Placeholder 2">
-            <a:extLst>
-              <a:ext uri="{FF2B5EF4-FFF2-40B4-BE49-F238E27FC236}">
-                <a16:creationId xmlns:a16="http://schemas.microsoft.com/office/drawing/2014/main" id="{552A9C73-06ED-419B-81B5-491CBFC22330}"/>
-              </a:ext>
-            </a:extLst>
-          </p:cNvPr>
-          <p:cNvSpPr>
-            <a:spLocks noGrp="1"/>
-          </p:cNvSpPr>
-          <p:nvPr>
-            <p:ph idx="1"/>
-          </p:nvPr>
-        </p:nvSpPr>
-        <p:spPr>
-          <a:xfrm>
-            <a:off x="538961" y="1825625"/>
-            <a:ext cx="3991476" cy="4359044"/>
-          </a:xfrm>
-        </p:spPr>
-        <p:txBody>
-          <a:bodyPr/>
-          <a:lstStyle/>
-          <a:p>
-            <a:pPr marL="0" indent="0">
-              <a:buNone/>
-            </a:pPr>
-            <a:r>
-              <a:rPr lang="en-US" sz="1600" dirty="0" smtClean="0"/>
-              <a:t>It is a 136mm by 82 mm by 16mm with four 11mm diameter holes </a:t>
-            </a:r>
-          </a:p>
-          <a:p>
-            <a:pPr marL="0" indent="0">
-              <a:buNone/>
-            </a:pPr>
-            <a:r>
-              <a:rPr lang="en-US" sz="1600" b="1" dirty="0" smtClean="0"/>
-              <a:t>PART DESIGN</a:t>
-            </a:r>
-            <a:r>
-              <a:rPr lang="en-US" sz="1600" dirty="0" smtClean="0"/>
-              <a:t>: - design with machining in mind.</a:t>
-            </a:r>
-          </a:p>
-          <a:p>
-            <a:pPr marL="400050" indent="-400050">
-              <a:buFont typeface="+mj-lt"/>
-              <a:buAutoNum type="romanUcPeriod"/>
-            </a:pPr>
-            <a:r>
-              <a:rPr lang="en-US" sz="1600" b="1" dirty="0" smtClean="0"/>
-              <a:t>2D MILLING (16mm flat mill)</a:t>
-            </a:r>
-          </a:p>
-          <a:p>
-            <a:pPr marL="0" indent="0">
-              <a:buNone/>
-            </a:pPr>
-            <a:r>
-              <a:rPr lang="en-US" sz="1600" b="1" dirty="0"/>
-              <a:t>	</a:t>
-            </a:r>
-            <a:r>
-              <a:rPr lang="en-US" sz="1600" b="1" dirty="0" smtClean="0"/>
-              <a:t>- </a:t>
-            </a:r>
-            <a:r>
-              <a:rPr lang="en-US" sz="1600" dirty="0" smtClean="0"/>
-              <a:t>Stock material removal.</a:t>
-            </a:r>
-          </a:p>
-          <a:p>
-            <a:pPr marL="0" indent="0">
-              <a:buNone/>
-            </a:pPr>
-            <a:r>
-              <a:rPr lang="en-US" sz="1600" b="1" dirty="0"/>
-              <a:t>	</a:t>
-            </a:r>
-            <a:r>
-              <a:rPr lang="en-US" sz="1600" b="1" dirty="0" smtClean="0"/>
-              <a:t>- </a:t>
-            </a:r>
-            <a:r>
-              <a:rPr lang="en-US" sz="1600" dirty="0" smtClean="0"/>
-              <a:t>top groove milling (2mm).</a:t>
-            </a:r>
-          </a:p>
-          <a:p>
-            <a:pPr marL="0" indent="0">
-              <a:buNone/>
-            </a:pPr>
-            <a:r>
-              <a:rPr lang="en-US" sz="1600" b="1" dirty="0"/>
-              <a:t>	</a:t>
-            </a:r>
-            <a:r>
-              <a:rPr lang="en-US" sz="1600" b="1" dirty="0" smtClean="0"/>
-              <a:t>- </a:t>
-            </a:r>
-            <a:r>
-              <a:rPr lang="en-US" sz="1600" dirty="0" smtClean="0"/>
-              <a:t>2 side grooves milling (2mm).</a:t>
-            </a:r>
-          </a:p>
-          <a:p>
-            <a:pPr marL="0" indent="0">
-              <a:buNone/>
-            </a:pPr>
-            <a:r>
-              <a:rPr lang="en-US" sz="1600" b="1" dirty="0"/>
-              <a:t>	</a:t>
-            </a:r>
-            <a:r>
-              <a:rPr lang="en-US" sz="1600" b="1" dirty="0" smtClean="0"/>
-              <a:t>- </a:t>
-            </a:r>
-            <a:r>
-              <a:rPr lang="en-US" sz="1600" dirty="0" smtClean="0"/>
-              <a:t>Filletin</a:t>
-            </a:r>
-            <a:r>
-              <a:rPr lang="en-US" sz="1600" dirty="0" smtClean="0"/>
-              <a:t>g (12mm radius).</a:t>
-            </a:r>
-          </a:p>
-          <a:p>
-            <a:pPr marL="0" indent="0">
-              <a:buNone/>
-            </a:pPr>
-            <a:r>
-              <a:rPr lang="en-US" sz="1600" b="1" dirty="0" smtClean="0"/>
-              <a:t>    MILLING: - </a:t>
-            </a:r>
-            <a:r>
-              <a:rPr lang="en-US" sz="1600" dirty="0" smtClean="0"/>
-              <a:t>Milling with mounting in mind.</a:t>
-            </a:r>
-          </a:p>
-          <a:p>
-            <a:pPr marL="0" indent="0">
-              <a:buNone/>
-            </a:pPr>
-            <a:r>
-              <a:rPr lang="en-US" sz="1600" b="1" dirty="0" smtClean="0"/>
-              <a:t>II. DRILLING (10mm drill)</a:t>
-            </a:r>
-          </a:p>
-          <a:p>
-            <a:pPr marL="0" indent="0">
-              <a:buNone/>
-            </a:pPr>
-            <a:r>
-              <a:rPr lang="en-US" sz="1800" b="1" dirty="0"/>
-              <a:t>	</a:t>
-            </a:r>
-            <a:r>
-              <a:rPr lang="en-US" sz="1800" b="1" dirty="0" smtClean="0"/>
-              <a:t>-</a:t>
-            </a:r>
-            <a:r>
-              <a:rPr lang="en-US" sz="1800" dirty="0" smtClean="0"/>
-              <a:t> </a:t>
-            </a:r>
-            <a:r>
-              <a:rPr lang="en-US" sz="1800" dirty="0"/>
-              <a:t>G</a:t>
-            </a:r>
-            <a:r>
-              <a:rPr lang="en-US" sz="1800" dirty="0" smtClean="0"/>
-              <a:t>uided drilling(5mm then 10mm)</a:t>
-            </a:r>
-          </a:p>
-          <a:p>
-            <a:pPr marL="0" indent="0">
-              <a:buNone/>
-            </a:pPr>
-            <a:r>
-              <a:rPr lang="en-US" sz="1800" b="1" dirty="0" smtClean="0"/>
-              <a:t>NOTE: - Two part</a:t>
-            </a:r>
-            <a:r>
-              <a:rPr lang="en-US" sz="1800" b="1" dirty="0" smtClean="0"/>
-              <a:t> machining</a:t>
-            </a:r>
-            <a:r>
-              <a:rPr lang="en-US" sz="1800" b="1" dirty="0" smtClean="0"/>
-              <a:t> </a:t>
-            </a:r>
-          </a:p>
-          <a:p>
-            <a:pPr marL="0" indent="0">
-              <a:buNone/>
-            </a:pPr>
-            <a:r>
-              <a:rPr lang="en-US" sz="1800" b="1" dirty="0" smtClean="0"/>
-              <a:t>            - machining time</a:t>
-            </a:r>
-          </a:p>
-          <a:p>
-            <a:pPr marL="0" indent="0">
-              <a:buNone/>
-            </a:pPr>
-            <a:endParaRPr lang="en-US" sz="1800" b="1" dirty="0" smtClean="0"/>
-          </a:p>
-          <a:p>
-            <a:pPr marL="0" indent="0">
-              <a:buNone/>
-            </a:pPr>
-            <a:endParaRPr lang="en-US" sz="1800" b="1" dirty="0" smtClean="0"/>
-          </a:p>
-        </p:txBody>
-      </p:sp>
-      <p:pic>
-        <p:nvPicPr>
-          <p:cNvPr id="7" name="Picture Placeholder 6">
-            <a:extLst>
-              <a:ext uri="{FF2B5EF4-FFF2-40B4-BE49-F238E27FC236}">
-                <a16:creationId xmlns:a16="http://schemas.microsoft.com/office/drawing/2014/main" id="{A241642C-CB49-4AA1-9EAD-3BCEA280B5B6}"/>
-              </a:ext>
-            </a:extLst>
-          </p:cNvPr>
-          <p:cNvPicPr>
-            <a:picLocks noGrp="1" noChangeAspect="1"/>
-          </p:cNvPicPr>
-          <p:nvPr>
-            <p:ph type="pic" sz="quarter" idx="13"/>
-          </p:nvPr>
-        </p:nvPicPr>
-        <p:blipFill>
-          <a:blip r:embed="rId3">
-            <a:extLst>
-              <a:ext uri="{28A0092B-C50C-407E-A947-70E740481C1C}">
-                <a14:useLocalDpi xmlns:a14="http://schemas.microsoft.com/office/drawing/2010/main" val="0"/>
-              </a:ext>
-            </a:extLst>
-          </a:blip>
-          <a:stretch>
-            <a:fillRect/>
-          </a:stretch>
-        </p:blipFill>
-        <p:spPr>
-          <a:xfrm>
-            <a:off x="5884648" y="127189"/>
-            <a:ext cx="6307353" cy="5525993"/>
-          </a:xfrm>
-        </p:spPr>
-      </p:pic>
-      <p:sp>
-        <p:nvSpPr>
-          <p:cNvPr id="4" name="Slide Number Placeholder 3">
-            <a:extLst>
-              <a:ext uri="{FF2B5EF4-FFF2-40B4-BE49-F238E27FC236}">
-                <a16:creationId xmlns:a16="http://schemas.microsoft.com/office/drawing/2014/main" id="{3B5C6BAC-F3F8-4AA0-B332-02F663571328}"/>
-              </a:ext>
-            </a:extLst>
-          </p:cNvPr>
-          <p:cNvSpPr>
-            <a:spLocks noGrp="1"/>
-          </p:cNvSpPr>
-          <p:nvPr>
-            <p:ph type="sldNum" sz="quarter" idx="12"/>
-          </p:nvPr>
-        </p:nvSpPr>
-        <p:spPr/>
-        <p:txBody>
-          <a:bodyPr/>
-          <a:lstStyle/>
-          <a:p>
-            <a:fld id="{9EC71654-96A5-4280-94F3-931C61A9F92C}" type="slidenum">
-              <a:rPr lang="en-US" smtClean="0"/>
-              <a:pPr/>
-              <a:t>4</a:t>
-            </a:fld>
             <a:endParaRPr lang="en-US" dirty="0"/>
           </a:p>
         </p:txBody>
@@ -24437,7 +24634,7 @@
     </p:spTree>
     <p:extLst>
       <p:ext uri="{BB962C8B-B14F-4D97-AF65-F5344CB8AC3E}">
-        <p14:creationId xmlns:p14="http://schemas.microsoft.com/office/powerpoint/2010/main" val="433561355"/>
+        <p14:creationId xmlns:p14="http://schemas.microsoft.com/office/powerpoint/2010/main" val="874188850"/>
       </p:ext>
     </p:extLst>
   </p:cSld>
@@ -24487,15 +24684,11 @@
           <a:p>
             <a:r>
               <a:rPr lang="en-US" dirty="0" smtClean="0"/>
-              <a:t>AXLE SUPPORT </a:t>
-            </a:r>
-            <a:r>
-              <a:rPr lang="en-US" dirty="0" smtClean="0"/>
-              <a:t>02</a:t>
+              <a:t>TOP PLATE </a:t>
             </a:r>
             <a:r>
               <a:rPr lang="en-US" dirty="0"/>
-              <a:t/>
+              <a:t>01</a:t>
             </a:r>
             <a:br>
               <a:rPr lang="en-US" dirty="0"/>
@@ -24523,7 +24716,7 @@
         <p:spPr>
           <a:xfrm>
             <a:off x="538961" y="1825625"/>
-            <a:ext cx="3991476" cy="4351338"/>
+            <a:ext cx="3991476" cy="4359044"/>
           </a:xfrm>
         </p:spPr>
         <p:txBody>
@@ -24534,31 +24727,8 @@
               <a:buNone/>
             </a:pPr>
             <a:r>
-              <a:rPr lang="en-US" sz="1800" dirty="0" smtClean="0"/>
-              <a:t>Connects the wheel axle and the top plate.</a:t>
-            </a:r>
-          </a:p>
-          <a:p>
-            <a:pPr>
-              <a:buFontTx/>
-              <a:buChar char="-"/>
-            </a:pPr>
-            <a:r>
-              <a:rPr lang="en-US" sz="1800" b="1" dirty="0" smtClean="0"/>
-              <a:t>Three part machin</a:t>
-            </a:r>
-            <a:r>
-              <a:rPr lang="en-US" sz="1800" b="1" dirty="0" smtClean="0"/>
-              <a:t>ing</a:t>
-            </a:r>
-          </a:p>
-          <a:p>
-            <a:pPr marL="400050" indent="-400050">
-              <a:buAutoNum type="romanUcPeriod"/>
-            </a:pPr>
-            <a:r>
-              <a:rPr lang="en-US" sz="1800" b="1" dirty="0" smtClean="0"/>
-              <a:t>2D MILLING</a:t>
+              <a:rPr lang="en-US" sz="1600" dirty="0" smtClean="0"/>
+              <a:t>It is a 136mm by 82 mm by 16mm with four 11mm diameter holes </a:t>
             </a:r>
           </a:p>
           <a:p>
@@ -24566,22 +24736,112 @@
               <a:buNone/>
             </a:pPr>
             <a:r>
-              <a:rPr lang="en-US" sz="1800" b="1" dirty="0" smtClean="0"/>
-              <a:t>	 - </a:t>
+              <a:rPr lang="en-US" sz="1600" b="1" dirty="0" smtClean="0"/>
+              <a:t>PART DESIGN</a:t>
             </a:r>
             <a:r>
-              <a:rPr lang="en-US" sz="1800" dirty="0" smtClean="0"/>
-              <a:t>Stock material removal.</a:t>
+              <a:rPr lang="en-US" sz="1600" dirty="0" smtClean="0"/>
+              <a:t>: - design with machining in mind.</a:t>
             </a:r>
-            <a:endParaRPr lang="en-US" sz="1800" b="1" dirty="0" smtClean="0"/>
+          </a:p>
+          <a:p>
+            <a:pPr marL="400050" indent="-400050">
+              <a:buFont typeface="+mj-lt"/>
+              <a:buAutoNum type="romanUcPeriod"/>
+            </a:pPr>
+            <a:r>
+              <a:rPr lang="en-US" sz="1600" b="1" dirty="0" smtClean="0"/>
+              <a:t>2D MILLING (16mm flat mill)</a:t>
+            </a:r>
           </a:p>
           <a:p>
             <a:pPr marL="0" indent="0">
               <a:buNone/>
             </a:pPr>
             <a:r>
-              <a:rPr lang="en-US" sz="1800" b="1" dirty="0" smtClean="0"/>
-              <a:t>II. 2D ADAPTIVE MILLING</a:t>
+              <a:rPr lang="en-US" sz="1600" b="1" dirty="0"/>
+              <a:t>	</a:t>
+            </a:r>
+            <a:r>
+              <a:rPr lang="en-US" sz="1600" b="1" dirty="0" smtClean="0"/>
+              <a:t>- </a:t>
+            </a:r>
+            <a:r>
+              <a:rPr lang="en-US" sz="1600" dirty="0" smtClean="0"/>
+              <a:t>Stock material removal.</a:t>
+            </a:r>
+          </a:p>
+          <a:p>
+            <a:pPr marL="0" indent="0">
+              <a:buNone/>
+            </a:pPr>
+            <a:r>
+              <a:rPr lang="en-US" sz="1600" b="1" dirty="0"/>
+              <a:t>	</a:t>
+            </a:r>
+            <a:r>
+              <a:rPr lang="en-US" sz="1600" b="1" dirty="0" smtClean="0"/>
+              <a:t>- </a:t>
+            </a:r>
+            <a:r>
+              <a:rPr lang="en-US" sz="1600" dirty="0" smtClean="0"/>
+              <a:t>top groove milling (2mm).</a:t>
+            </a:r>
+          </a:p>
+          <a:p>
+            <a:pPr marL="0" indent="0">
+              <a:buNone/>
+            </a:pPr>
+            <a:r>
+              <a:rPr lang="en-US" sz="1600" b="1" dirty="0"/>
+              <a:t>	</a:t>
+            </a:r>
+            <a:r>
+              <a:rPr lang="en-US" sz="1600" b="1" dirty="0" smtClean="0"/>
+              <a:t>- </a:t>
+            </a:r>
+            <a:r>
+              <a:rPr lang="en-US" sz="1600" dirty="0" smtClean="0"/>
+              <a:t>2 side grooves milling (2mm).</a:t>
+            </a:r>
+          </a:p>
+          <a:p>
+            <a:pPr marL="0" indent="0">
+              <a:buNone/>
+            </a:pPr>
+            <a:r>
+              <a:rPr lang="en-US" sz="1600" b="1" dirty="0"/>
+              <a:t>	</a:t>
+            </a:r>
+            <a:r>
+              <a:rPr lang="en-US" sz="1600" b="1" dirty="0" smtClean="0"/>
+              <a:t>- </a:t>
+            </a:r>
+            <a:r>
+              <a:rPr lang="en-US" sz="1600" dirty="0" smtClean="0"/>
+              <a:t>Filleting (12mm radius).</a:t>
+            </a:r>
+          </a:p>
+          <a:p>
+            <a:pPr marL="0" indent="0">
+              <a:buNone/>
+            </a:pPr>
+            <a:r>
+              <a:rPr lang="en-US" sz="1600" b="1" dirty="0" smtClean="0"/>
+              <a:t>    MILLING: - </a:t>
+            </a:r>
+            <a:r>
+              <a:rPr lang="en-US" sz="1600" dirty="0" smtClean="0"/>
+              <a:t>Milling with mounting in mind.</a:t>
+            </a:r>
+          </a:p>
+          <a:p>
+            <a:pPr marL="0" indent="0">
+              <a:buNone/>
+            </a:pPr>
+            <a:r>
+              <a:rPr lang="en-US" sz="1600" b="1" dirty="0" smtClean="0"/>
+              <a:t>II. DRILLING (10mm drill)</a:t>
             </a:r>
           </a:p>
           <a:p>
@@ -24594,64 +24854,20 @@
             </a:r>
             <a:r>
               <a:rPr lang="en-US" sz="1800" b="1" dirty="0" smtClean="0"/>
-              <a:t>- </a:t>
+              <a:t>-</a:t>
             </a:r>
             <a:r>
               <a:rPr lang="en-US" sz="1800" dirty="0" smtClean="0"/>
-              <a:t>Milling pockets around the rib.</a:t>
-            </a:r>
-          </a:p>
-          <a:p>
-            <a:pPr marL="0" indent="0">
-              <a:buNone/>
-            </a:pPr>
-            <a:r>
-              <a:rPr lang="en-US" sz="1800" b="1" dirty="0"/>
-              <a:t>	</a:t>
+              <a:t> </a:t>
             </a:r>
             <a:r>
-              <a:rPr lang="en-US" sz="1800" b="1" dirty="0" smtClean="0"/>
-              <a:t>- </a:t>
+              <a:rPr lang="en-US" sz="1800" dirty="0"/>
+              <a:t>G</a:t>
             </a:r>
             <a:r>
               <a:rPr lang="en-US" sz="1800" dirty="0" smtClean="0"/>
-              <a:t>Milling the gradient of the rib.</a:t>
+              <a:t>uided drilling(5mm then 10mm)</a:t>
             </a:r>
-          </a:p>
-          <a:p>
-            <a:pPr marL="0" indent="0">
-              <a:buNone/>
-            </a:pPr>
-            <a:r>
-              <a:rPr lang="en-US" sz="1800" b="1" dirty="0"/>
-              <a:t>	</a:t>
-            </a:r>
-            <a:r>
-              <a:rPr lang="en-US" sz="1800" b="1" dirty="0" smtClean="0"/>
-              <a:t>- </a:t>
-            </a:r>
-            <a:r>
-              <a:rPr lang="en-US" sz="1800" dirty="0" smtClean="0"/>
-              <a:t>Filleting edges.</a:t>
-            </a:r>
-          </a:p>
-          <a:p>
-            <a:pPr marL="0" indent="0">
-              <a:buNone/>
-            </a:pPr>
-            <a:r>
-              <a:rPr lang="en-US" sz="1800" b="1" dirty="0"/>
-              <a:t>	</a:t>
-            </a:r>
-            <a:r>
-              <a:rPr lang="en-US" sz="1800" b="1" dirty="0" smtClean="0"/>
-              <a:t>- </a:t>
-            </a:r>
-            <a:r>
-              <a:rPr lang="en-US" sz="1800" dirty="0" smtClean="0"/>
-              <a:t>Drilling by milling.</a:t>
-            </a:r>
-            <a:endParaRPr lang="en-US" sz="1800" b="1" dirty="0" smtClean="0"/>
           </a:p>
           <a:p>
             <a:pPr marL="0" indent="0">
@@ -24659,22 +24875,34 @@
             </a:pPr>
             <a:r>
               <a:rPr lang="en-US" sz="1800" b="1" dirty="0" smtClean="0"/>
-              <a:t>III. FINISHING</a:t>
+              <a:t>NOTE: - Two part </a:t>
             </a:r>
+            <a:r>
+              <a:rPr lang="en-US" sz="1800" b="1" dirty="0" smtClean="0"/>
+              <a:t>machining</a:t>
+            </a:r>
+            <a:endParaRPr lang="en-US" sz="1800" b="1" dirty="0" smtClean="0"/>
           </a:p>
           <a:p>
             <a:pPr marL="0" indent="0">
               <a:buNone/>
             </a:pPr>
             <a:r>
-              <a:rPr lang="en-US" sz="1800" dirty="0"/>
-              <a:t>	</a:t>
+              <a:rPr lang="en-US" sz="1800" b="1" dirty="0" smtClean="0"/>
+              <a:t>            - machining time</a:t>
             </a:r>
-            <a:r>
-              <a:rPr lang="en-US" sz="1800" dirty="0" smtClean="0"/>
-              <a:t>- Ball mill for smooth rib gradient.</a:t>
-            </a:r>
-            <a:endParaRPr lang="en-US" sz="1800" dirty="0"/>
+          </a:p>
+          <a:p>
+            <a:pPr marL="0" indent="0">
+              <a:buNone/>
+            </a:pPr>
+            <a:endParaRPr lang="en-US" sz="1800" b="1" dirty="0" smtClean="0"/>
+          </a:p>
+          <a:p>
+            <a:pPr marL="0" indent="0">
+              <a:buNone/>
+            </a:pPr>
+            <a:endParaRPr lang="en-US" sz="1800" b="1" dirty="0" smtClean="0"/>
           </a:p>
         </p:txBody>
       </p:sp>
@@ -24708,8 +24936,8 @@
         </p:blipFill>
         <p:spPr>
           <a:xfrm>
-            <a:off x="5884648" y="27338"/>
-            <a:ext cx="6307353" cy="5725695"/>
+            <a:off x="5884648" y="127189"/>
+            <a:ext cx="6307353" cy="5525993"/>
           </a:xfrm>
         </p:spPr>
       </p:pic>
@@ -24746,7 +24974,7 @@
     </p:spTree>
     <p:extLst>
       <p:ext uri="{BB962C8B-B14F-4D97-AF65-F5344CB8AC3E}">
-        <p14:creationId xmlns:p14="http://schemas.microsoft.com/office/powerpoint/2010/main" val="733638642"/>
+        <p14:creationId xmlns:p14="http://schemas.microsoft.com/office/powerpoint/2010/main" val="433561355"/>
       </p:ext>
     </p:extLst>
   </p:cSld>
@@ -24778,7 +25006,7 @@
           <p:cNvPr id="2" name="Title 1">
             <a:extLst>
               <a:ext uri="{FF2B5EF4-FFF2-40B4-BE49-F238E27FC236}">
-                <a16:creationId xmlns:a16="http://schemas.microsoft.com/office/drawing/2014/main" id="{903A9A18-93E0-4615-B7AA-B8C8FBB14464}"/>
+                <a16:creationId xmlns:a16="http://schemas.microsoft.com/office/drawing/2014/main" id="{E2C50832-0B36-43C5-98EC-4CD165D78718}"/>
               </a:ext>
             </a:extLst>
           </p:cNvPr>
@@ -24796,15 +25024,7 @@
           <a:p>
             <a:r>
               <a:rPr lang="en-US" dirty="0" smtClean="0"/>
-              <a:t>AXLE </a:t>
-            </a:r>
-            <a:r>
-              <a:rPr lang="en-US" dirty="0"/>
-              <a:t>0</a:t>
-            </a:r>
-            <a:r>
-              <a:rPr lang="en-US" dirty="0" smtClean="0"/>
-              <a:t>3</a:t>
+              <a:t>AXLE SUPPORT 02</a:t>
             </a:r>
             <a:r>
               <a:rPr lang="en-US" dirty="0"/>
@@ -24822,7 +25042,7 @@
           <p:cNvPr id="3" name="Content Placeholder 2">
             <a:extLst>
               <a:ext uri="{FF2B5EF4-FFF2-40B4-BE49-F238E27FC236}">
-                <a16:creationId xmlns:a16="http://schemas.microsoft.com/office/drawing/2014/main" id="{B91B32C0-5E61-447F-9557-57AF415D6FE9}"/>
+                <a16:creationId xmlns:a16="http://schemas.microsoft.com/office/drawing/2014/main" id="{552A9C73-06ED-419B-81B5-491CBFC22330}"/>
               </a:ext>
             </a:extLst>
           </p:cNvPr>
@@ -24835,8 +25055,8 @@
         </p:nvSpPr>
         <p:spPr>
           <a:xfrm>
-            <a:off x="538960" y="1825625"/>
-            <a:ext cx="4151027" cy="4351338"/>
+            <a:off x="538961" y="1825625"/>
+            <a:ext cx="3991476" cy="4351338"/>
           </a:xfrm>
         </p:spPr>
         <p:txBody>
@@ -24848,7 +25068,17 @@
             </a:pPr>
             <a:r>
               <a:rPr lang="en-US" sz="1800" dirty="0" smtClean="0"/>
-              <a:t>Supports the wheel. Cylindrical, 21.9mm O.D. , 17.9mm I.D. , and 78mm length. </a:t>
+              <a:t>Connects the wheel axle and the top plate.</a:t>
+            </a:r>
+          </a:p>
+          <a:p>
+            <a:pPr>
+              <a:buFontTx/>
+              <a:buChar char="-"/>
+            </a:pPr>
+            <a:r>
+              <a:rPr lang="en-US" sz="1800" b="1" dirty="0" smtClean="0"/>
+              <a:t>Three part machining</a:t>
             </a:r>
           </a:p>
           <a:p>
@@ -24857,7 +25087,30 @@
             </a:pPr>
             <a:r>
               <a:rPr lang="en-US" sz="1800" b="1" dirty="0" smtClean="0"/>
-              <a:t>FACING</a:t>
+              <a:t>2D MILLING</a:t>
+            </a:r>
+          </a:p>
+          <a:p>
+            <a:pPr marL="0" indent="0">
+              <a:buNone/>
+            </a:pPr>
+            <a:r>
+              <a:rPr lang="en-US" sz="1800" b="1" dirty="0" smtClean="0"/>
+              <a:t>	 - </a:t>
+            </a:r>
+            <a:r>
+              <a:rPr lang="en-US" sz="1800" dirty="0" smtClean="0"/>
+              <a:t>Stock material removal.</a:t>
+            </a:r>
+            <a:endParaRPr lang="en-US" sz="1800" b="1" dirty="0" smtClean="0"/>
+          </a:p>
+          <a:p>
+            <a:pPr marL="0" indent="0">
+              <a:buNone/>
+            </a:pPr>
+            <a:r>
+              <a:rPr lang="en-US" sz="1800" b="1" dirty="0" smtClean="0"/>
+              <a:t>II. 2D ADAPTIVE MILLING</a:t>
             </a:r>
           </a:p>
           <a:p>
@@ -24874,16 +25127,68 @@
             </a:r>
             <a:r>
               <a:rPr lang="en-US" sz="1800" dirty="0" smtClean="0"/>
-              <a:t>Removal extra stock material.</a:t>
+              <a:t>Milling pockets around the rib.</a:t>
             </a:r>
           </a:p>
           <a:p>
-            <a:pPr marL="400050" indent="-400050">
-              <a:buAutoNum type="romanUcPeriod" startAt="2"/>
+            <a:pPr marL="0" indent="0">
+              <a:buNone/>
+            </a:pPr>
+            <a:r>
+              <a:rPr lang="en-US" sz="1800" b="1" dirty="0"/>
+              <a:t>	</a:t>
+            </a:r>
+            <a:r>
+              <a:rPr lang="en-US" sz="1800" b="1" dirty="0" smtClean="0"/>
+              <a:t>- </a:t>
+            </a:r>
+            <a:r>
+              <a:rPr lang="en-US" sz="1800" dirty="0" smtClean="0"/>
+              <a:t>Milling the gradient of the rib.</a:t>
+            </a:r>
+          </a:p>
+          <a:p>
+            <a:pPr marL="0" indent="0">
+              <a:buNone/>
+            </a:pPr>
+            <a:r>
+              <a:rPr lang="en-US" sz="1800" b="1" dirty="0"/>
+              <a:t>	</a:t>
+            </a:r>
+            <a:r>
+              <a:rPr lang="en-US" sz="1800" b="1" dirty="0" smtClean="0"/>
+              <a:t>- </a:t>
+            </a:r>
+            <a:r>
+              <a:rPr lang="en-US" sz="1800" dirty="0" smtClean="0"/>
+              <a:t>Filleting edges.</a:t>
+            </a:r>
+          </a:p>
+          <a:p>
+            <a:pPr marL="0" indent="0">
+              <a:buNone/>
+            </a:pPr>
+            <a:r>
+              <a:rPr lang="en-US" sz="1800" b="1" dirty="0"/>
+              <a:t>	</a:t>
+            </a:r>
+            <a:r>
+              <a:rPr lang="en-US" sz="1800" b="1" dirty="0" smtClean="0"/>
+              <a:t>- </a:t>
+            </a:r>
+            <a:r>
+              <a:rPr lang="en-US" sz="1800" dirty="0" smtClean="0"/>
+              <a:t>Drilling by milling.</a:t>
+            </a:r>
+            <a:endParaRPr lang="en-US" sz="1800" b="1" dirty="0" smtClean="0"/>
+          </a:p>
+          <a:p>
+            <a:pPr marL="0" indent="0">
+              <a:buNone/>
             </a:pPr>
             <a:r>
               <a:rPr lang="en-US" sz="1800" b="1" dirty="0" smtClean="0"/>
-              <a:t>PATTERN TURNING</a:t>
+              <a:t>III. FINISHING</a:t>
             </a:r>
           </a:p>
           <a:p>
@@ -24896,33 +25201,8 @@
             </a:r>
             <a:r>
               <a:rPr lang="en-US" sz="1800" dirty="0" smtClean="0"/>
-              <a:t>- Pattern: chamfer, side parting</a:t>
+              <a:t>- Ball mill for smooth rib gradient.</a:t>
             </a:r>
-          </a:p>
-          <a:p>
-            <a:pPr marL="0" indent="0">
-              <a:buNone/>
-            </a:pPr>
-            <a:endParaRPr lang="en-US" sz="1800" dirty="0"/>
-          </a:p>
-          <a:p>
-            <a:pPr marL="0" indent="0">
-              <a:buNone/>
-            </a:pPr>
-            <a:r>
-              <a:rPr lang="en-US" sz="1800" b="1" dirty="0" smtClean="0"/>
-              <a:t>NOTE: - </a:t>
-            </a:r>
-            <a:r>
-              <a:rPr lang="en-US" sz="1800" dirty="0" smtClean="0"/>
-              <a:t>two part milling (symmetric)</a:t>
-            </a:r>
-            <a:endParaRPr lang="en-US" sz="1800" b="1" dirty="0" smtClean="0"/>
-          </a:p>
-          <a:p>
-            <a:pPr marL="0" indent="0">
-              <a:buNone/>
-            </a:pPr>
             <a:endParaRPr lang="en-US" sz="1800" dirty="0"/>
           </a:p>
         </p:txBody>
@@ -24932,7 +25212,7 @@
           <p:cNvPr id="7" name="Picture Placeholder 6">
             <a:extLst>
               <a:ext uri="{FF2B5EF4-FFF2-40B4-BE49-F238E27FC236}">
-                <a16:creationId xmlns:a16="http://schemas.microsoft.com/office/drawing/2014/main" id="{29305ED8-D39E-4A20-A7CB-7EC58B3E325D}"/>
+                <a16:creationId xmlns:a16="http://schemas.microsoft.com/office/drawing/2014/main" id="{A241642C-CB49-4AA1-9EAD-3BCEA280B5B6}"/>
               </a:ext>
             </a:extLst>
           </p:cNvPr>
@@ -24957,8 +25237,8 @@
         </p:blipFill>
         <p:spPr>
           <a:xfrm>
-            <a:off x="5455212" y="1150167"/>
-            <a:ext cx="4884848" cy="4561585"/>
+            <a:off x="5884648" y="27338"/>
+            <a:ext cx="6307353" cy="5725695"/>
           </a:xfrm>
         </p:spPr>
       </p:pic>
@@ -24967,7 +25247,7 @@
           <p:cNvPr id="4" name="Slide Number Placeholder 3">
             <a:extLst>
               <a:ext uri="{FF2B5EF4-FFF2-40B4-BE49-F238E27FC236}">
-                <a16:creationId xmlns:a16="http://schemas.microsoft.com/office/drawing/2014/main" id="{0BDDBFEE-BC50-46CF-AB8F-D145B99B57A6}"/>
+                <a16:creationId xmlns:a16="http://schemas.microsoft.com/office/drawing/2014/main" id="{3B5C6BAC-F3F8-4AA0-B332-02F663571328}"/>
               </a:ext>
             </a:extLst>
           </p:cNvPr>
@@ -24995,7 +25275,7 @@
     </p:spTree>
     <p:extLst>
       <p:ext uri="{BB962C8B-B14F-4D97-AF65-F5344CB8AC3E}">
-        <p14:creationId xmlns:p14="http://schemas.microsoft.com/office/powerpoint/2010/main" val="961730162"/>
+        <p14:creationId xmlns:p14="http://schemas.microsoft.com/office/powerpoint/2010/main" val="733638642"/>
       </p:ext>
     </p:extLst>
   </p:cSld>
@@ -25045,11 +25325,15 @@
           <a:p>
             <a:r>
               <a:rPr lang="en-US" dirty="0" smtClean="0"/>
-              <a:t>WHEEL </a:t>
+              <a:t>AXLE </a:t>
+            </a:r>
+            <a:r>
+              <a:rPr lang="en-US" dirty="0"/>
+              <a:t>0</a:t>
             </a:r>
             <a:r>
               <a:rPr lang="en-US" dirty="0" smtClean="0"/>
-              <a:t>04</a:t>
+              <a:t>3</a:t>
             </a:r>
             <a:r>
               <a:rPr lang="en-US" dirty="0"/>
@@ -25093,69 +25377,16 @@
             </a:pPr>
             <a:r>
               <a:rPr lang="en-US" sz="1800" dirty="0" smtClean="0"/>
-              <a:t>Interfaces with either the rail or the ground.</a:t>
+              <a:t>Supports the wheel. Cylindrical, 21.9mm O.D. , 17.9mm I.D. , and 78mm length. </a:t>
             </a:r>
           </a:p>
           <a:p>
             <a:pPr marL="400050" indent="-400050">
-              <a:buFont typeface="+mj-lt"/>
               <a:buAutoNum type="romanUcPeriod"/>
             </a:pPr>
             <a:r>
               <a:rPr lang="en-US" sz="1800" b="1" dirty="0" smtClean="0"/>
-              <a:t>2D MILLING</a:t>
-            </a:r>
-          </a:p>
-          <a:p>
-            <a:pPr marL="0" indent="0">
-              <a:buNone/>
-            </a:pPr>
-            <a:r>
-              <a:rPr lang="en-US" sz="1800" b="1" dirty="0"/>
-              <a:t> </a:t>
-            </a:r>
-            <a:r>
-              <a:rPr lang="en-US" sz="1800" b="1" dirty="0" smtClean="0"/>
-              <a:t>      	- </a:t>
-            </a:r>
-            <a:r>
-              <a:rPr lang="en-US" sz="1800" dirty="0" smtClean="0"/>
-              <a:t>Stock extra  material removal.</a:t>
-            </a:r>
-          </a:p>
-          <a:p>
-            <a:pPr marL="400050" indent="-400050">
-              <a:buAutoNum type="romanUcPeriod" startAt="2"/>
-            </a:pPr>
-            <a:r>
-              <a:rPr lang="en-US" sz="1800" b="1" dirty="0" smtClean="0"/>
-              <a:t>2D CONTOUR MILLING.</a:t>
-            </a:r>
-          </a:p>
-          <a:p>
-            <a:pPr marL="0" indent="0">
-              <a:buNone/>
-            </a:pPr>
-            <a:r>
-              <a:rPr lang="en-US" sz="1800" b="1" dirty="0"/>
-              <a:t> </a:t>
-            </a:r>
-            <a:r>
-              <a:rPr lang="en-US" sz="1800" b="1" dirty="0" smtClean="0"/>
-              <a:t>	- </a:t>
-            </a:r>
-            <a:r>
-              <a:rPr lang="en-US" sz="1800" dirty="0" smtClean="0"/>
-              <a:t>chamfer milling</a:t>
-            </a:r>
-          </a:p>
-          <a:p>
-            <a:pPr marL="400050" indent="-400050">
-              <a:buAutoNum type="romanUcPeriod" startAt="3"/>
-            </a:pPr>
-            <a:r>
-              <a:rPr lang="en-US" sz="1800" b="1" dirty="0" smtClean="0"/>
-              <a:t>DRILLING BY MILLING</a:t>
+              <a:t>FACING</a:t>
             </a:r>
           </a:p>
           <a:p>
@@ -25168,18 +25399,41 @@
             </a:r>
             <a:r>
               <a:rPr lang="en-US" sz="1800" b="1" dirty="0" smtClean="0"/>
-              <a:t> - </a:t>
+              <a:t>- </a:t>
             </a:r>
             <a:r>
               <a:rPr lang="en-US" sz="1800" dirty="0" smtClean="0"/>
-              <a:t>circular milling with increasing feed rate.</a:t>
+              <a:t>Removal extra stock material.</a:t>
             </a:r>
+          </a:p>
+          <a:p>
+            <a:pPr marL="400050" indent="-400050">
+              <a:buAutoNum type="romanUcPeriod" startAt="2"/>
+            </a:pPr>
+            <a:r>
+              <a:rPr lang="en-US" sz="1800" b="1" dirty="0" smtClean="0"/>
+              <a:t>PROFILE TURNING</a:t>
+            </a:r>
+            <a:endParaRPr lang="en-US" sz="1800" b="1" dirty="0" smtClean="0"/>
           </a:p>
           <a:p>
             <a:pPr marL="0" indent="0">
               <a:buNone/>
             </a:pPr>
-            <a:endParaRPr lang="en-US" sz="1800" b="1" dirty="0"/>
+            <a:r>
+              <a:rPr lang="en-US" sz="1800" dirty="0"/>
+              <a:t>	</a:t>
+            </a:r>
+            <a:r>
+              <a:rPr lang="en-US" sz="1800" dirty="0" smtClean="0"/>
+              <a:t>- Pattern: chamfer, side parting</a:t>
+            </a:r>
+          </a:p>
+          <a:p>
+            <a:pPr marL="0" indent="0">
+              <a:buNone/>
+            </a:pPr>
+            <a:endParaRPr lang="en-US" sz="1800" dirty="0"/>
           </a:p>
           <a:p>
             <a:pPr marL="0" indent="0">
@@ -25187,22 +25441,8 @@
             </a:pPr>
             <a:r>
               <a:rPr lang="en-US" sz="1800" b="1" dirty="0" smtClean="0"/>
-              <a:t>Note:- Machining time</a:t>
+              <a:t>NOTE: - two part milling (symmetric)</a:t>
             </a:r>
-          </a:p>
-          <a:p>
-            <a:pPr marL="0" indent="0">
-              <a:buNone/>
-            </a:pPr>
-            <a:r>
-              <a:rPr lang="en-US" sz="1800" b="1" dirty="0" smtClean="0"/>
-              <a:t>          - Symmetric  two part millin</a:t>
-            </a:r>
-            <a:r>
-              <a:rPr lang="en-US" sz="1800" b="1" dirty="0" smtClean="0"/>
-              <a:t>g.</a:t>
-            </a:r>
-            <a:endParaRPr lang="en-US" sz="1800" b="1" dirty="0"/>
           </a:p>
           <a:p>
             <a:pPr marL="0" indent="0">
@@ -25242,8 +25482,8 @@
         </p:blipFill>
         <p:spPr>
           <a:xfrm>
-            <a:off x="5455212" y="1116924"/>
-            <a:ext cx="4884848" cy="4628072"/>
+            <a:off x="5455212" y="1150167"/>
+            <a:ext cx="4884848" cy="4561585"/>
           </a:xfrm>
         </p:spPr>
       </p:pic>
@@ -25280,7 +25520,7 @@
     </p:spTree>
     <p:extLst>
       <p:ext uri="{BB962C8B-B14F-4D97-AF65-F5344CB8AC3E}">
-        <p14:creationId xmlns:p14="http://schemas.microsoft.com/office/powerpoint/2010/main" val="1958625792"/>
+        <p14:creationId xmlns:p14="http://schemas.microsoft.com/office/powerpoint/2010/main" val="961730162"/>
       </p:ext>
     </p:extLst>
   </p:cSld>
@@ -25312,7 +25552,7 @@
           <p:cNvPr id="2" name="Title 1">
             <a:extLst>
               <a:ext uri="{FF2B5EF4-FFF2-40B4-BE49-F238E27FC236}">
-                <a16:creationId xmlns:a16="http://schemas.microsoft.com/office/drawing/2014/main" id="{1C63C2D9-0850-4620-BE32-11F44A927662}"/>
+                <a16:creationId xmlns:a16="http://schemas.microsoft.com/office/drawing/2014/main" id="{903A9A18-93E0-4615-B7AA-B8C8FBB14464}"/>
               </a:ext>
             </a:extLst>
           </p:cNvPr>
@@ -25330,89 +25570,25 @@
           <a:p>
             <a:r>
               <a:rPr lang="en-US" dirty="0" smtClean="0"/>
-              <a:t>NOTE</a:t>
+              <a:t>WHEEL 04</a:t>
             </a:r>
             <a:r>
-              <a:rPr lang="en-US" dirty="0" smtClean="0"/>
-              <a:t> 01</a:t>
+              <a:rPr lang="en-US" dirty="0"/>
+              <a:t/>
             </a:r>
+            <a:br>
+              <a:rPr lang="en-US" dirty="0"/>
+            </a:br>
             <a:endParaRPr lang="en-US" dirty="0"/>
           </a:p>
         </p:txBody>
       </p:sp>
       <p:sp>
         <p:nvSpPr>
-          <p:cNvPr id="5" name="Content Placeholder 4">
+          <p:cNvPr id="3" name="Content Placeholder 2">
             <a:extLst>
               <a:ext uri="{FF2B5EF4-FFF2-40B4-BE49-F238E27FC236}">
-                <a16:creationId xmlns:a16="http://schemas.microsoft.com/office/drawing/2014/main" id="{93A6F33C-3AFE-474E-AC15-C00F368C3C6A}"/>
-              </a:ext>
-            </a:extLst>
-          </p:cNvPr>
-          <p:cNvSpPr>
-            <a:spLocks noGrp="1"/>
-          </p:cNvSpPr>
-          <p:nvPr>
-            <p:ph idx="15"/>
-          </p:nvPr>
-        </p:nvSpPr>
-        <p:spPr/>
-        <p:txBody>
-          <a:bodyPr/>
-          <a:lstStyle/>
-          <a:p>
-            <a:r>
-              <a:rPr lang="en-US" dirty="0" smtClean="0"/>
-              <a:t>NOTE</a:t>
-            </a:r>
-            <a:r>
-              <a:rPr lang="en-US" dirty="0" smtClean="0"/>
-              <a:t> 01        MACHINING  TIME</a:t>
-            </a:r>
-            <a:endParaRPr lang="en-US" dirty="0"/>
-          </a:p>
-        </p:txBody>
-      </p:sp>
-      <p:pic>
-        <p:nvPicPr>
-          <p:cNvPr id="29" name="Picture Placeholder 28" descr="Pencil">
-            <a:extLst>
-              <a:ext uri="{FF2B5EF4-FFF2-40B4-BE49-F238E27FC236}">
-                <a16:creationId xmlns:a16="http://schemas.microsoft.com/office/drawing/2014/main" id="{F0E35123-11A3-CD40-A44F-8A81B9105639}"/>
-              </a:ext>
-            </a:extLst>
-          </p:cNvPr>
-          <p:cNvPicPr>
-            <a:picLocks noGrp="1" noChangeAspect="1"/>
-          </p:cNvPicPr>
-          <p:nvPr>
-            <p:ph type="pic" sz="quarter" idx="21"/>
-          </p:nvPr>
-        </p:nvPicPr>
-        <p:blipFill>
-          <a:blip r:embed="rId3">
-            <a:extLst>
-              <a:ext uri="{28A0092B-C50C-407E-A947-70E740481C1C}">
-                <a14:useLocalDpi xmlns:a14="http://schemas.microsoft.com/office/drawing/2010/main"/>
-              </a:ext>
-              <a:ext uri="{96DAC541-7B7A-43D3-8B79-37D633B846F1}">
-                <asvg:svgBlip xmlns="" xmlns:asvg="http://schemas.microsoft.com/office/drawing/2016/SVG/main" r:embed="rId4"/>
-              </a:ext>
-            </a:extLst>
-          </a:blip>
-          <a:srcRect/>
-          <a:stretch>
-            <a:fillRect/>
-          </a:stretch>
-        </p:blipFill>
-        <p:spPr/>
-      </p:pic>
-      <p:sp>
-        <p:nvSpPr>
-          <p:cNvPr id="3" name="Content Placeholder 2">
-            <a:extLst>
-              <a:ext uri="{FF2B5EF4-FFF2-40B4-BE49-F238E27FC236}">
-                <a16:creationId xmlns:a16="http://schemas.microsoft.com/office/drawing/2014/main" id="{65015163-D5FD-4849-978B-77883FAF7928}"/>
+                <a16:creationId xmlns:a16="http://schemas.microsoft.com/office/drawing/2014/main" id="{B91B32C0-5E61-447F-9557-57AF415D6FE9}"/>
               </a:ext>
             </a:extLst>
           </p:cNvPr>
@@ -25423,131 +25599,142 @@
             <p:ph idx="1"/>
           </p:nvPr>
         </p:nvSpPr>
-        <p:spPr/>
+        <p:spPr>
+          <a:xfrm>
+            <a:off x="538960" y="1825625"/>
+            <a:ext cx="4151027" cy="4351338"/>
+          </a:xfrm>
+        </p:spPr>
         <p:txBody>
           <a:bodyPr/>
           <a:lstStyle/>
           <a:p>
-            <a:pPr marL="285750" indent="-285750" algn="l">
-              <a:buFontTx/>
-              <a:buChar char="-"/>
+            <a:pPr marL="0" indent="0">
+              <a:buNone/>
             </a:pPr>
             <a:r>
-              <a:rPr lang="en-US" sz="2400" dirty="0" smtClean="0"/>
-              <a:t>Tool travel path. Idling.</a:t>
+              <a:rPr lang="en-US" sz="1800" dirty="0" smtClean="0"/>
+              <a:t>Interfaces with either the rail or the ground.</a:t>
             </a:r>
           </a:p>
           <a:p>
-            <a:pPr marL="285750" indent="-285750" algn="l">
-              <a:buFontTx/>
-              <a:buChar char="-"/>
+            <a:pPr marL="400050" indent="-400050">
+              <a:buFont typeface="+mj-lt"/>
+              <a:buAutoNum type="romanUcPeriod"/>
             </a:pPr>
             <a:r>
-              <a:rPr lang="en-US" sz="2400" dirty="0" smtClean="0"/>
-              <a:t>Adaptive milling. Optimized tool path.</a:t>
+              <a:rPr lang="en-US" sz="1800" b="1" dirty="0" smtClean="0"/>
+              <a:t>2D MILLING</a:t>
             </a:r>
           </a:p>
           <a:p>
-            <a:pPr marL="285750" indent="-285750" algn="l">
-              <a:buFontTx/>
-              <a:buChar char="-"/>
-            </a:pPr>
-            <a:endParaRPr lang="en-US" sz="2400" dirty="0" smtClean="0"/>
-          </a:p>
-          <a:p>
-            <a:pPr algn="l"/>
-            <a:endParaRPr lang="en-US" sz="2400" dirty="0" smtClean="0"/>
-          </a:p>
-          <a:p>
-            <a:pPr marL="285750" indent="-285750" algn="l">
-              <a:buFontTx/>
-              <a:buChar char="-"/>
-            </a:pPr>
-            <a:endParaRPr lang="en-US" sz="2400" dirty="0" smtClean="0"/>
-          </a:p>
-          <a:p>
-            <a:pPr marL="285750" indent="-285750" algn="l">
-              <a:buFontTx/>
-              <a:buChar char="-"/>
-            </a:pPr>
-            <a:endParaRPr lang="en-US" sz="2400" dirty="0"/>
-          </a:p>
-        </p:txBody>
-      </p:sp>
-      <p:sp>
-        <p:nvSpPr>
-          <p:cNvPr id="8" name="Content Placeholder 7">
-            <a:extLst>
-              <a:ext uri="{FF2B5EF4-FFF2-40B4-BE49-F238E27FC236}">
-                <a16:creationId xmlns:a16="http://schemas.microsoft.com/office/drawing/2014/main" id="{C8438480-8B6F-44E5-A602-6240C1B85FB3}"/>
-              </a:ext>
-            </a:extLst>
-          </p:cNvPr>
-          <p:cNvSpPr>
-            <a:spLocks noGrp="1"/>
-          </p:cNvSpPr>
-          <p:nvPr>
-            <p:ph idx="19"/>
-          </p:nvPr>
-        </p:nvSpPr>
-        <p:spPr/>
-        <p:txBody>
-          <a:bodyPr/>
-          <a:lstStyle/>
-          <a:p>
-            <a:pPr marL="285750" indent="-285750">
-              <a:buFontTx/>
-              <a:buChar char="-"/>
+            <a:pPr marL="0" indent="0">
+              <a:buNone/>
             </a:pPr>
             <a:r>
-              <a:rPr lang="en-US" sz="1600" b="1" dirty="0" smtClean="0"/>
-              <a:t>Ball milling tool for 2D millin</a:t>
+              <a:rPr lang="en-US" sz="1800" b="1" dirty="0"/>
+              <a:t> </a:t>
             </a:r>
             <a:r>
-              <a:rPr lang="en-US" b="1" dirty="0" smtClean="0"/>
-              <a:t>g </a:t>
+              <a:rPr lang="en-US" sz="1800" b="1" dirty="0" smtClean="0"/>
+              <a:t>      	- </a:t>
             </a:r>
             <a:r>
-              <a:rPr lang="en-US" sz="1600" b="1" dirty="0" smtClean="0"/>
-              <a:t>ribs.</a:t>
+              <a:rPr lang="en-US" sz="1800" dirty="0" smtClean="0"/>
+              <a:t>Stock extra  material removal.</a:t>
             </a:r>
           </a:p>
           <a:p>
-            <a:pPr marL="285750" indent="-285750">
-              <a:buFontTx/>
-              <a:buChar char="-"/>
+            <a:pPr marL="400050" indent="-400050">
+              <a:buAutoNum type="romanUcPeriod" startAt="2"/>
             </a:pPr>
             <a:r>
-              <a:rPr lang="en-US" b="1" dirty="0" smtClean="0"/>
-              <a:t>0.5mm material left for finishin</a:t>
+              <a:rPr lang="en-US" sz="1800" b="1" dirty="0" smtClean="0"/>
+              <a:t>2D CONTOUR MILLING.</a:t>
+            </a:r>
+          </a:p>
+          <a:p>
+            <a:pPr marL="0" indent="0">
+              <a:buNone/>
+            </a:pPr>
+            <a:r>
+              <a:rPr lang="en-US" sz="1800" b="1" dirty="0"/>
+              <a:t> </a:t>
             </a:r>
             <a:r>
-              <a:rPr lang="en-US" b="1" dirty="0" smtClean="0"/>
-              <a:t>g.</a:t>
+              <a:rPr lang="en-US" sz="1800" b="1" dirty="0" smtClean="0"/>
+              <a:t>	- </a:t>
             </a:r>
-          </a:p>
-          <a:p>
-            <a:pPr marL="285750" indent="-285750">
-              <a:buFontTx/>
-              <a:buChar char="-"/>
+            <a:r>
+              <a:rPr lang="en-US" sz="1800" dirty="0" smtClean="0"/>
+              <a:t>chamfer milling</a:t>
+            </a:r>
+          </a:p>
+          <a:p>
+            <a:pPr marL="400050" indent="-400050">
+              <a:buAutoNum type="romanUcPeriod" startAt="3"/>
             </a:pPr>
             <a:r>
-              <a:rPr lang="en-US" b="1" dirty="0" smtClean="0"/>
-              <a:t>Tool speed.</a:t>
+              <a:rPr lang="en-US" sz="1800" b="1" dirty="0" smtClean="0"/>
+              <a:t>DRILLING BY MILLING</a:t>
             </a:r>
-            <a:endParaRPr lang="en-US" sz="1600" b="1" dirty="0" smtClean="0"/>
-          </a:p>
-          <a:p>
-            <a:endParaRPr lang="en-US" sz="1600" dirty="0"/>
+          </a:p>
+          <a:p>
+            <a:pPr marL="0" indent="0">
+              <a:buNone/>
+            </a:pPr>
+            <a:r>
+              <a:rPr lang="en-US" sz="1800" b="1" dirty="0"/>
+              <a:t>	</a:t>
+            </a:r>
+            <a:r>
+              <a:rPr lang="en-US" sz="1800" b="1" dirty="0" smtClean="0"/>
+              <a:t> - </a:t>
+            </a:r>
+            <a:r>
+              <a:rPr lang="en-US" sz="1800" dirty="0" smtClean="0"/>
+              <a:t>circular milling with increasing feed rate.</a:t>
+            </a:r>
+          </a:p>
+          <a:p>
+            <a:pPr marL="0" indent="0">
+              <a:buNone/>
+            </a:pPr>
+            <a:endParaRPr lang="en-US" sz="1800" b="1" dirty="0"/>
+          </a:p>
+          <a:p>
+            <a:pPr marL="0" indent="0">
+              <a:buNone/>
+            </a:pPr>
+            <a:r>
+              <a:rPr lang="en-US" sz="1800" b="1" dirty="0" smtClean="0"/>
+              <a:t>Note:- Machining time</a:t>
+            </a:r>
+          </a:p>
+          <a:p>
+            <a:pPr marL="0" indent="0">
+              <a:buNone/>
+            </a:pPr>
+            <a:r>
+              <a:rPr lang="en-US" sz="1800" b="1" dirty="0" smtClean="0"/>
+              <a:t>          - Symmetric  two part milling.</a:t>
+            </a:r>
+            <a:endParaRPr lang="en-US" sz="1800" b="1" dirty="0"/>
+          </a:p>
+          <a:p>
+            <a:pPr marL="0" indent="0">
+              <a:buNone/>
+            </a:pPr>
+            <a:endParaRPr lang="en-US" sz="1800" dirty="0"/>
           </a:p>
         </p:txBody>
       </p:sp>
       <p:pic>
         <p:nvPicPr>
-          <p:cNvPr id="31" name="Picture Placeholder 30" descr="Laptop">
+          <p:cNvPr id="7" name="Picture Placeholder 6">
             <a:extLst>
               <a:ext uri="{FF2B5EF4-FFF2-40B4-BE49-F238E27FC236}">
-                <a16:creationId xmlns:a16="http://schemas.microsoft.com/office/drawing/2014/main" id="{6BF407E9-98AE-2B40-90E3-1B14FC14FDB8}"/>
+                <a16:creationId xmlns:a16="http://schemas.microsoft.com/office/drawing/2014/main" id="{29305ED8-D39E-4A20-A7CB-7EC58B3E325D}"/>
               </a:ext>
             </a:extLst>
           </p:cNvPr>
@@ -25555,66 +25742,34 @@
             <a:picLocks noGrp="1" noChangeAspect="1"/>
           </p:cNvPicPr>
           <p:nvPr>
-            <p:ph type="pic" sz="quarter" idx="22"/>
+            <p:ph type="pic" sz="quarter" idx="13"/>
           </p:nvPr>
         </p:nvPicPr>
         <p:blipFill>
-          <a:blip r:embed="rId5" cstate="print">
+          <a:blip r:embed="rId3">
             <a:extLst>
               <a:ext uri="{28A0092B-C50C-407E-A947-70E740481C1C}">
-                <a14:useLocalDpi xmlns:a14="http://schemas.microsoft.com/office/drawing/2010/main"/>
-              </a:ext>
-              <a:ext uri="{96DAC541-7B7A-43D3-8B79-37D633B846F1}">
-                <asvg:svgBlip xmlns="" xmlns:asvg="http://schemas.microsoft.com/office/drawing/2016/SVG/main" r:embed="rId6"/>
+                <a14:useLocalDpi xmlns:a14="http://schemas.microsoft.com/office/drawing/2010/main" val="0"/>
               </a:ext>
             </a:extLst>
           </a:blip>
-          <a:srcRect/>
           <a:stretch>
             <a:fillRect/>
           </a:stretch>
         </p:blipFill>
-        <p:spPr/>
+        <p:spPr>
+          <a:xfrm>
+            <a:off x="5455212" y="1116924"/>
+            <a:ext cx="4884848" cy="4628072"/>
+          </a:xfrm>
+        </p:spPr>
       </p:pic>
       <p:sp>
         <p:nvSpPr>
-          <p:cNvPr id="9" name="Content Placeholder 8">
+          <p:cNvPr id="4" name="Slide Number Placeholder 3">
             <a:extLst>
               <a:ext uri="{FF2B5EF4-FFF2-40B4-BE49-F238E27FC236}">
-                <a16:creationId xmlns:a16="http://schemas.microsoft.com/office/drawing/2014/main" id="{A1EE8A19-6968-4C81-B180-20FEF61ADEE1}"/>
-              </a:ext>
-            </a:extLst>
-          </p:cNvPr>
-          <p:cNvSpPr>
-            <a:spLocks noGrp="1"/>
-          </p:cNvSpPr>
-          <p:nvPr>
-            <p:ph idx="20"/>
-          </p:nvPr>
-        </p:nvSpPr>
-        <p:spPr/>
-        <p:txBody>
-          <a:bodyPr/>
-          <a:lstStyle/>
-          <a:p>
-            <a:r>
-              <a:rPr lang="en-US" dirty="0" smtClean="0"/>
-              <a:t>NOTE</a:t>
-            </a:r>
-            <a:r>
-              <a:rPr lang="en-US" dirty="0" smtClean="0"/>
-              <a:t> 02     SURFACE  AESTHETICS</a:t>
-            </a:r>
-            <a:endParaRPr lang="en-US" dirty="0"/>
-          </a:p>
-        </p:txBody>
-      </p:sp>
-      <p:sp>
-        <p:nvSpPr>
-          <p:cNvPr id="4" name="Slide Number Placeholder 3">
-            <a:extLst>
-              <a:ext uri="{FF2B5EF4-FFF2-40B4-BE49-F238E27FC236}">
-                <a16:creationId xmlns:a16="http://schemas.microsoft.com/office/drawing/2014/main" id="{CA1C0347-C2C9-46A2-B7A6-9653B525F7DD}"/>
+                <a16:creationId xmlns:a16="http://schemas.microsoft.com/office/drawing/2014/main" id="{0BDDBFEE-BC50-46CF-AB8F-D145B99B57A6}"/>
               </a:ext>
             </a:extLst>
           </p:cNvPr>
@@ -25642,7 +25797,7 @@
     </p:spTree>
     <p:extLst>
       <p:ext uri="{BB962C8B-B14F-4D97-AF65-F5344CB8AC3E}">
-        <p14:creationId xmlns:p14="http://schemas.microsoft.com/office/powerpoint/2010/main" val="269403648"/>
+        <p14:creationId xmlns:p14="http://schemas.microsoft.com/office/powerpoint/2010/main" val="1958625792"/>
       </p:ext>
     </p:extLst>
   </p:cSld>
@@ -25692,11 +25847,7 @@
           <a:p>
             <a:r>
               <a:rPr lang="en-US" dirty="0" smtClean="0"/>
-              <a:t>NOTE</a:t>
-            </a:r>
-            <a:r>
-              <a:rPr lang="en-US" dirty="0" smtClean="0"/>
-              <a:t> 02</a:t>
+              <a:t>NOTE 01</a:t>
             </a:r>
             <a:endParaRPr lang="en-US" dirty="0"/>
           </a:p>
@@ -25725,11 +25876,7 @@
           <a:p>
             <a:r>
               <a:rPr lang="en-US" dirty="0" smtClean="0"/>
-              <a:t>NOTE</a:t>
-            </a:r>
-            <a:r>
-              <a:rPr lang="en-US" dirty="0" smtClean="0"/>
-              <a:t> 03       not achieved</a:t>
+              <a:t>NOTE 01        MACHINING  TIME</a:t>
             </a:r>
             <a:endParaRPr lang="en-US" dirty="0"/>
           </a:p>
@@ -25758,7 +25905,7 @@
                 <a14:useLocalDpi xmlns:a14="http://schemas.microsoft.com/office/drawing/2010/main"/>
               </a:ext>
               <a:ext uri="{96DAC541-7B7A-43D3-8B79-37D633B846F1}">
-                <asvg:svgBlip xmlns="" xmlns:asvg="http://schemas.microsoft.com/office/drawing/2016/SVG/main" r:embed="rId4"/>
+                <asvg:svgBlip xmlns:asvg="http://schemas.microsoft.com/office/drawing/2016/SVG/main" xmlns="" r:embed="rId4"/>
               </a:ext>
             </a:extLst>
           </a:blip>
@@ -25796,7 +25943,7 @@
             </a:pPr>
             <a:r>
               <a:rPr lang="en-US" sz="2400" dirty="0" smtClean="0"/>
-              <a:t>Synchronizing subsequent adaptive milling operations.</a:t>
+              <a:t>Tool travel path. Idling.</a:t>
             </a:r>
           </a:p>
           <a:p>
@@ -25806,17 +25953,7 @@
             </a:pPr>
             <a:r>
               <a:rPr lang="en-US" sz="2400" dirty="0" smtClean="0"/>
-              <a:t>Filleting for the axle support.</a:t>
-            </a:r>
-          </a:p>
-          <a:p>
-            <a:pPr marL="285750" indent="-285750" algn="l">
-              <a:buFontTx/>
-              <a:buChar char="-"/>
-            </a:pPr>
-            <a:r>
-              <a:rPr lang="en-US" sz="2400" dirty="0" smtClean="0"/>
-              <a:t>Smooth finishing for the axle support’s rib.</a:t>
+              <a:t>Adaptive milling. Optimized tool path.</a:t>
             </a:r>
           </a:p>
           <a:p>
@@ -25867,10 +26004,45 @@
           <a:bodyPr/>
           <a:lstStyle/>
           <a:p>
+            <a:pPr marL="285750" indent="-285750">
+              <a:buFontTx/>
+              <a:buChar char="-"/>
+            </a:pPr>
             <a:r>
-              <a:rPr lang="en-US" sz="1600" dirty="0" smtClean="0"/>
-              <a:t>-  TODO</a:t>
+              <a:rPr lang="en-US" sz="1600" b="1" dirty="0" smtClean="0"/>
+              <a:t>Ball milling tool for 2D millin</a:t>
             </a:r>
+            <a:r>
+              <a:rPr lang="en-US" b="1" dirty="0" smtClean="0"/>
+              <a:t>g </a:t>
+            </a:r>
+            <a:r>
+              <a:rPr lang="en-US" sz="1600" b="1" dirty="0" smtClean="0"/>
+              <a:t>ribs.</a:t>
+            </a:r>
+          </a:p>
+          <a:p>
+            <a:pPr marL="285750" indent="-285750">
+              <a:buFontTx/>
+              <a:buChar char="-"/>
+            </a:pPr>
+            <a:r>
+              <a:rPr lang="en-US" b="1" dirty="0" smtClean="0"/>
+              <a:t>0.5mm material left for finishing.</a:t>
+            </a:r>
+          </a:p>
+          <a:p>
+            <a:pPr marL="285750" indent="-285750">
+              <a:buFontTx/>
+              <a:buChar char="-"/>
+            </a:pPr>
+            <a:r>
+              <a:rPr lang="en-US" b="1" dirty="0" smtClean="0"/>
+              <a:t>Tool speed.</a:t>
+            </a:r>
+            <a:endParaRPr lang="en-US" sz="1600" b="1" dirty="0" smtClean="0"/>
+          </a:p>
+          <a:p>
             <a:endParaRPr lang="en-US" sz="1600" dirty="0"/>
           </a:p>
         </p:txBody>
@@ -25898,7 +26070,7 @@
                 <a14:useLocalDpi xmlns:a14="http://schemas.microsoft.com/office/drawing/2010/main"/>
               </a:ext>
               <a:ext uri="{96DAC541-7B7A-43D3-8B79-37D633B846F1}">
-                <asvg:svgBlip xmlns="" xmlns:asvg="http://schemas.microsoft.com/office/drawing/2016/SVG/main" r:embed="rId6"/>
+                <asvg:svgBlip xmlns:asvg="http://schemas.microsoft.com/office/drawing/2016/SVG/main" xmlns="" r:embed="rId6"/>
               </a:ext>
             </a:extLst>
           </a:blip>
@@ -25932,15 +26104,7 @@
           <a:p>
             <a:r>
               <a:rPr lang="en-US" dirty="0" smtClean="0"/>
-              <a:t>NOTE</a:t>
-            </a:r>
-            <a:r>
-              <a:rPr lang="en-US" dirty="0" smtClean="0"/>
-              <a:t> 02    </a:t>
-            </a:r>
-            <a:r>
-              <a:rPr lang="en-US" dirty="0" err="1" smtClean="0"/>
-              <a:t>todo</a:t>
+              <a:t>NOTE 02     SURFACE  AESTHETICS</a:t>
             </a:r>
             <a:endParaRPr lang="en-US" dirty="0"/>
           </a:p>
@@ -25979,7 +26143,7 @@
     </p:spTree>
     <p:extLst>
       <p:ext uri="{BB962C8B-B14F-4D97-AF65-F5344CB8AC3E}">
-        <p14:creationId xmlns:p14="http://schemas.microsoft.com/office/powerpoint/2010/main" val="1750884515"/>
+        <p14:creationId xmlns:p14="http://schemas.microsoft.com/office/powerpoint/2010/main" val="269403648"/>
       </p:ext>
     </p:extLst>
   </p:cSld>
@@ -26789,6 +26953,15 @@
 </file>
 
 <file path=customXml/item2.xml><?xml version="1.0" encoding="utf-8"?>
+<?mso-contentType ?>
+<FormTemplates xmlns="http://schemas.microsoft.com/sharepoint/v3/contenttype/forms">
+  <Display>DocumentLibraryForm</Display>
+  <Edit>DocumentLibraryForm</Edit>
+  <New>DocumentLibraryForm</New>
+</FormTemplates>
+</file>
+
+<file path=customXml/item3.xml><?xml version="1.0" encoding="utf-8"?>
 <ct:contentTypeSchema xmlns:ct="http://schemas.microsoft.com/office/2006/metadata/contentType" xmlns:ma="http://schemas.microsoft.com/office/2006/metadata/properties/metaAttributes" ct:_="" ma:_="" ma:contentTypeName="Document" ma:contentTypeID="0x01010079F111ED35F8CC479449609E8A0923A6" ma:contentTypeVersion="11" ma:contentTypeDescription="Create a new document." ma:contentTypeScope="" ma:versionID="9677210f24a1be23c92c90fd886aa0aa">
   <xsd:schema xmlns:xsd="http://www.w3.org/2001/XMLSchema" xmlns:xs="http://www.w3.org/2001/XMLSchema" xmlns:p="http://schemas.microsoft.com/office/2006/metadata/properties" xmlns:ns2="71af3243-3dd4-4a8d-8c0d-dd76da1f02a5" xmlns:ns3="16c05727-aa75-4e4a-9b5f-8a80a1165891" targetNamespace="http://schemas.microsoft.com/office/2006/metadata/properties" ma:root="true" ma:fieldsID="60e05723c5c1908df1a1a4ebf11d344e" ns2:_="" ns3:_="">
     <xsd:import namespace="71af3243-3dd4-4a8d-8c0d-dd76da1f02a5"/>
@@ -26999,15 +27172,6 @@
 </ct:contentTypeSchema>
 </file>
 
-<file path=customXml/item3.xml><?xml version="1.0" encoding="utf-8"?>
-<?mso-contentType ?>
-<FormTemplates xmlns="http://schemas.microsoft.com/sharepoint/v3/contenttype/forms">
-  <Display>DocumentLibraryForm</Display>
-  <Edit>DocumentLibraryForm</Edit>
-  <New>DocumentLibraryForm</New>
-</FormTemplates>
-</file>
-
 <file path=customXml/itemProps1.xml><?xml version="1.0" encoding="utf-8"?>
 <ds:datastoreItem xmlns:ds="http://schemas.openxmlformats.org/officeDocument/2006/customXml" ds:itemID="{CEA9B47F-3DD8-4645-81DC-B88780643C07}">
   <ds:schemaRefs>
@@ -27019,6 +27183,14 @@
 </file>
 
 <file path=customXml/itemProps2.xml><?xml version="1.0" encoding="utf-8"?>
+<ds:datastoreItem xmlns:ds="http://schemas.openxmlformats.org/officeDocument/2006/customXml" ds:itemID="{B0C07E3D-60A7-4F4E-8208-D9CCD01982CB}">
+  <ds:schemaRefs>
+    <ds:schemaRef ds:uri="http://schemas.microsoft.com/sharepoint/v3/contenttype/forms"/>
+  </ds:schemaRefs>
+</ds:datastoreItem>
+</file>
+
+<file path=customXml/itemProps3.xml><?xml version="1.0" encoding="utf-8"?>
 <ds:datastoreItem xmlns:ds="http://schemas.openxmlformats.org/officeDocument/2006/customXml" ds:itemID="{631071E6-22AE-499A-B09C-BF21CF5F7483}">
   <ds:schemaRefs>
     <ds:schemaRef ds:uri="http://schemas.microsoft.com/office/2006/metadata/contentType"/>
@@ -27035,12 +27207,4 @@
     <ds:schemaRef ds:uri="http://schemas.microsoft.com/internal/obd"/>
   </ds:schemaRefs>
 </ds:datastoreItem>
-</file>
-
-<file path=customXml/itemProps3.xml><?xml version="1.0" encoding="utf-8"?>
-<ds:datastoreItem xmlns:ds="http://schemas.openxmlformats.org/officeDocument/2006/customXml" ds:itemID="{B0C07E3D-60A7-4F4E-8208-D9CCD01982CB}">
-  <ds:schemaRefs>
-    <ds:schemaRef ds:uri="http://schemas.microsoft.com/sharepoint/v3/contenttype/forms"/>
-  </ds:schemaRefs>
-</ds:datastoreItem>
 </file>
</xml_diff>